<commit_message>
Added Javadoc to everything. Didnt clean up yet
</commit_message>
<xml_diff>
--- a/vortrag/ba_seminar_presentation_reduce.pptx
+++ b/vortrag/ba_seminar_presentation_reduce.pptx
@@ -5,7 +5,7 @@
     <p:sldMasterId id="2147483648" r:id="rId1"/>
   </p:sldMasterIdLst>
   <p:notesMasterIdLst>
-    <p:notesMasterId r:id="rId25"/>
+    <p:notesMasterId r:id="rId26"/>
   </p:notesMasterIdLst>
   <p:sldIdLst>
     <p:sldId id="256" r:id="rId2"/>
@@ -31,6 +31,7 @@
     <p:sldId id="272" r:id="rId22"/>
     <p:sldId id="270" r:id="rId23"/>
     <p:sldId id="273" r:id="rId24"/>
+    <p:sldId id="289" r:id="rId25"/>
   </p:sldIdLst>
   <p:sldSz cx="9144000" cy="6858000" type="screen4x3"/>
   <p:notesSz cx="6858000" cy="9144000"/>
@@ -219,7 +220,7 @@
           <a:p>
             <a:fld id="{02DEFC3C-AF63-412B-984B-9E1D725FE3B8}" type="datetimeFigureOut">
               <a:rPr lang="de-DE" smtClean="0"/>
-              <a:t>24.09.2018</a:t>
+              <a:t>25.09.2018</a:t>
             </a:fld>
             <a:endParaRPr lang="de-DE"/>
           </a:p>
@@ -616,6 +617,555 @@
               <a:bodyPr/>
               <a:lstStyle/>
               <a:p>
+                <a:r>
+                  <a:rPr lang="de-DE"/>
+                  <a:t>Even assuming the reality would follow the Kalman Filter‘s model, the process noise </a:t>
+                </a:r>
+                <a14:m>
+                  <m:oMath xmlns:m="http://schemas.openxmlformats.org/officeDocument/2006/math">
+                    <m:sSub>
+                      <m:sSubPr>
+                        <m:ctrlPr>
+                          <a:rPr lang="de-DE" b="0" i="1" smtClean="0">
+                            <a:latin typeface="Cambria Math" panose="02040503050406030204" pitchFamily="18" charset="0"/>
+                          </a:rPr>
+                        </m:ctrlPr>
+                      </m:sSubPr>
+                      <m:e>
+                        <m:r>
+                          <a:rPr lang="de-DE" b="0" i="1" smtClean="0">
+                            <a:latin typeface="Cambria Math" panose="02040503050406030204" pitchFamily="18" charset="0"/>
+                          </a:rPr>
+                          <m:t>𝑤</m:t>
+                        </m:r>
+                      </m:e>
+                      <m:sub>
+                        <m:r>
+                          <a:rPr lang="de-DE" b="0" i="1" smtClean="0">
+                            <a:latin typeface="Cambria Math" panose="02040503050406030204" pitchFamily="18" charset="0"/>
+                          </a:rPr>
+                          <m:t>𝑘</m:t>
+                        </m:r>
+                      </m:sub>
+                    </m:sSub>
+                  </m:oMath>
+                </a14:m>
+                <a:r>
+                  <a:rPr lang="de-DE"/>
+                  <a:t> makes it necessary</a:t>
+                </a:r>
+                <a:r>
+                  <a:rPr lang="de-DE" baseline="0"/>
+                  <a:t> to use a filter instead of running the equation over and over…</a:t>
+                </a:r>
+                <a:endParaRPr lang="de-DE"/>
+              </a:p>
+            </p:txBody>
+          </p:sp>
+        </mc:Choice>
+        <mc:Fallback xmlns="">
+          <p:sp>
+            <p:nvSpPr>
+              <p:cNvPr id="3" name="Notizenplatzhalter 2"/>
+              <p:cNvSpPr>
+                <a:spLocks noGrp="1"/>
+              </p:cNvSpPr>
+              <p:nvPr>
+                <p:ph type="body" idx="1"/>
+              </p:nvPr>
+            </p:nvSpPr>
+            <p:spPr/>
+            <p:txBody>
+              <a:bodyPr/>
+              <a:lstStyle/>
+              <a:p>
+                <a:r>
+                  <a:rPr lang="de-DE"/>
+                  <a:t>Even assuming the reality would follow the Kalman Filter‘s model, the process noise </a:t>
+                </a:r>
+                <a:r>
+                  <a:rPr lang="de-DE" b="0" i="0">
+                    <a:latin typeface="Cambria Math" panose="02040503050406030204" pitchFamily="18" charset="0"/>
+                  </a:rPr>
+                  <a:t>𝑤_𝑘</a:t>
+                </a:r>
+                <a:r>
+                  <a:rPr lang="de-DE"/>
+                  <a:t> makes it necessary</a:t>
+                </a:r>
+                <a:r>
+                  <a:rPr lang="de-DE" baseline="0"/>
+                  <a:t> to use a filter instead of running the equation over and over…</a:t>
+                </a:r>
+                <a:endParaRPr lang="de-DE"/>
+              </a:p>
+            </p:txBody>
+          </p:sp>
+        </mc:Fallback>
+      </mc:AlternateContent>
+      <p:sp>
+        <p:nvSpPr>
+          <p:cNvPr id="4" name="Foliennummernplatzhalter 3"/>
+          <p:cNvSpPr>
+            <a:spLocks noGrp="1"/>
+          </p:cNvSpPr>
+          <p:nvPr>
+            <p:ph type="sldNum" sz="quarter" idx="5"/>
+          </p:nvPr>
+        </p:nvSpPr>
+        <p:spPr/>
+        <p:txBody>
+          <a:bodyPr/>
+          <a:lstStyle/>
+          <a:p>
+            <a:fld id="{416FB7CF-276F-45FE-92E9-289D7174B126}" type="slidenum">
+              <a:rPr lang="de-DE" smtClean="0"/>
+              <a:t>16</a:t>
+            </a:fld>
+            <a:endParaRPr lang="de-DE"/>
+          </a:p>
+        </p:txBody>
+      </p:sp>
+    </p:spTree>
+    <p:extLst>
+      <p:ext uri="{BB962C8B-B14F-4D97-AF65-F5344CB8AC3E}">
+        <p14:creationId xmlns:p14="http://schemas.microsoft.com/office/powerpoint/2010/main" val="3320482346"/>
+      </p:ext>
+    </p:extLst>
+  </p:cSld>
+  <p:clrMapOvr>
+    <a:masterClrMapping/>
+  </p:clrMapOvr>
+</p:notes>
+</file>
+
+<file path=ppt/notesSlides/notesSlide11.xml><?xml version="1.0" encoding="utf-8"?>
+<p:notes xmlns:a="http://schemas.openxmlformats.org/drawingml/2006/main" xmlns:r="http://schemas.openxmlformats.org/officeDocument/2006/relationships" xmlns:p="http://schemas.openxmlformats.org/presentationml/2006/main">
+  <p:cSld>
+    <p:spTree>
+      <p:nvGrpSpPr>
+        <p:cNvPr id="1" name=""/>
+        <p:cNvGrpSpPr/>
+        <p:nvPr/>
+      </p:nvGrpSpPr>
+      <p:grpSpPr>
+        <a:xfrm>
+          <a:off x="0" y="0"/>
+          <a:ext cx="0" cy="0"/>
+          <a:chOff x="0" y="0"/>
+          <a:chExt cx="0" cy="0"/>
+        </a:xfrm>
+      </p:grpSpPr>
+      <p:sp>
+        <p:nvSpPr>
+          <p:cNvPr id="2" name="Folienbildplatzhalter 1"/>
+          <p:cNvSpPr>
+            <a:spLocks noGrp="1" noRot="1" noChangeAspect="1"/>
+          </p:cNvSpPr>
+          <p:nvPr>
+            <p:ph type="sldImg"/>
+          </p:nvPr>
+        </p:nvSpPr>
+        <p:spPr/>
+      </p:sp>
+      <mc:AlternateContent xmlns:mc="http://schemas.openxmlformats.org/markup-compatibility/2006" xmlns:a14="http://schemas.microsoft.com/office/drawing/2010/main">
+        <mc:Choice Requires="a14">
+          <p:sp>
+            <p:nvSpPr>
+              <p:cNvPr id="3" name="Notizenplatzhalter 2"/>
+              <p:cNvSpPr>
+                <a:spLocks noGrp="1"/>
+              </p:cNvSpPr>
+              <p:nvPr>
+                <p:ph type="body" idx="1"/>
+              </p:nvPr>
+            </p:nvSpPr>
+            <p:spPr/>
+            <p:txBody>
+              <a:bodyPr/>
+              <a:lstStyle/>
+              <a:p>
+                <a:endParaRPr lang="de-DE"/>
+              </a:p>
+            </p:txBody>
+          </p:sp>
+        </mc:Choice>
+        <mc:Fallback xmlns="">
+          <p:sp>
+            <p:nvSpPr>
+              <p:cNvPr id="3" name="Notizenplatzhalter 2"/>
+              <p:cNvSpPr>
+                <a:spLocks noGrp="1"/>
+              </p:cNvSpPr>
+              <p:nvPr>
+                <p:ph type="body" idx="1"/>
+              </p:nvPr>
+            </p:nvSpPr>
+            <p:spPr/>
+            <p:txBody>
+              <a:bodyPr/>
+              <a:lstStyle/>
+              <a:p>
+                <a:r>
+                  <a:rPr lang="de-DE"/>
+                  <a:t>Even assuming the reality would follow the Kalman Filter‘s model, the process noise </a:t>
+                </a:r>
+                <a:r>
+                  <a:rPr lang="de-DE" b="0" i="0">
+                    <a:latin typeface="Cambria Math" panose="02040503050406030204" pitchFamily="18" charset="0"/>
+                  </a:rPr>
+                  <a:t>𝑤_𝑘</a:t>
+                </a:r>
+                <a:r>
+                  <a:rPr lang="de-DE"/>
+                  <a:t> makes it necessary</a:t>
+                </a:r>
+                <a:r>
+                  <a:rPr lang="de-DE" baseline="0"/>
+                  <a:t> to use a filter instead of running the equation over and over…</a:t>
+                </a:r>
+                <a:endParaRPr lang="de-DE"/>
+              </a:p>
+            </p:txBody>
+          </p:sp>
+        </mc:Fallback>
+      </mc:AlternateContent>
+      <p:sp>
+        <p:nvSpPr>
+          <p:cNvPr id="4" name="Foliennummernplatzhalter 3"/>
+          <p:cNvSpPr>
+            <a:spLocks noGrp="1"/>
+          </p:cNvSpPr>
+          <p:nvPr>
+            <p:ph type="sldNum" sz="quarter" idx="5"/>
+          </p:nvPr>
+        </p:nvSpPr>
+        <p:spPr/>
+        <p:txBody>
+          <a:bodyPr/>
+          <a:lstStyle/>
+          <a:p>
+            <a:fld id="{416FB7CF-276F-45FE-92E9-289D7174B126}" type="slidenum">
+              <a:rPr lang="de-DE" smtClean="0"/>
+              <a:t>19</a:t>
+            </a:fld>
+            <a:endParaRPr lang="de-DE"/>
+          </a:p>
+        </p:txBody>
+      </p:sp>
+    </p:spTree>
+    <p:extLst>
+      <p:ext uri="{BB962C8B-B14F-4D97-AF65-F5344CB8AC3E}">
+        <p14:creationId xmlns:p14="http://schemas.microsoft.com/office/powerpoint/2010/main" val="4252002354"/>
+      </p:ext>
+    </p:extLst>
+  </p:cSld>
+  <p:clrMapOvr>
+    <a:masterClrMapping/>
+  </p:clrMapOvr>
+</p:notes>
+</file>
+
+<file path=ppt/notesSlides/notesSlide12.xml><?xml version="1.0" encoding="utf-8"?>
+<p:notes xmlns:a="http://schemas.openxmlformats.org/drawingml/2006/main" xmlns:r="http://schemas.openxmlformats.org/officeDocument/2006/relationships" xmlns:p="http://schemas.openxmlformats.org/presentationml/2006/main">
+  <p:cSld>
+    <p:spTree>
+      <p:nvGrpSpPr>
+        <p:cNvPr id="1" name=""/>
+        <p:cNvGrpSpPr/>
+        <p:nvPr/>
+      </p:nvGrpSpPr>
+      <p:grpSpPr>
+        <a:xfrm>
+          <a:off x="0" y="0"/>
+          <a:ext cx="0" cy="0"/>
+          <a:chOff x="0" y="0"/>
+          <a:chExt cx="0" cy="0"/>
+        </a:xfrm>
+      </p:grpSpPr>
+      <p:sp>
+        <p:nvSpPr>
+          <p:cNvPr id="2" name="Folienbildplatzhalter 1"/>
+          <p:cNvSpPr>
+            <a:spLocks noGrp="1" noRot="1" noChangeAspect="1"/>
+          </p:cNvSpPr>
+          <p:nvPr>
+            <p:ph type="sldImg"/>
+          </p:nvPr>
+        </p:nvSpPr>
+        <p:spPr/>
+      </p:sp>
+      <mc:AlternateContent xmlns:mc="http://schemas.openxmlformats.org/markup-compatibility/2006" xmlns:a14="http://schemas.microsoft.com/office/drawing/2010/main">
+        <mc:Choice Requires="a14">
+          <p:sp>
+            <p:nvSpPr>
+              <p:cNvPr id="3" name="Notizenplatzhalter 2"/>
+              <p:cNvSpPr>
+                <a:spLocks noGrp="1"/>
+              </p:cNvSpPr>
+              <p:nvPr>
+                <p:ph type="body" idx="1"/>
+              </p:nvPr>
+            </p:nvSpPr>
+            <p:spPr/>
+            <p:txBody>
+              <a:bodyPr/>
+              <a:lstStyle/>
+              <a:p>
+                <a:endParaRPr lang="de-DE"/>
+              </a:p>
+            </p:txBody>
+          </p:sp>
+        </mc:Choice>
+        <mc:Fallback xmlns="">
+          <p:sp>
+            <p:nvSpPr>
+              <p:cNvPr id="3" name="Notizenplatzhalter 2"/>
+              <p:cNvSpPr>
+                <a:spLocks noGrp="1"/>
+              </p:cNvSpPr>
+              <p:nvPr>
+                <p:ph type="body" idx="1"/>
+              </p:nvPr>
+            </p:nvSpPr>
+            <p:spPr/>
+            <p:txBody>
+              <a:bodyPr/>
+              <a:lstStyle/>
+              <a:p>
+                <a:r>
+                  <a:rPr lang="de-DE"/>
+                  <a:t>Even assuming the reality would follow the Kalman Filter‘s model, the process noise </a:t>
+                </a:r>
+                <a:r>
+                  <a:rPr lang="de-DE" b="0" i="0">
+                    <a:latin typeface="Cambria Math" panose="02040503050406030204" pitchFamily="18" charset="0"/>
+                  </a:rPr>
+                  <a:t>𝑤_𝑘</a:t>
+                </a:r>
+                <a:r>
+                  <a:rPr lang="de-DE"/>
+                  <a:t> makes it necessary</a:t>
+                </a:r>
+                <a:r>
+                  <a:rPr lang="de-DE" baseline="0"/>
+                  <a:t> to use a filter instead of running the equation over and over…</a:t>
+                </a:r>
+                <a:endParaRPr lang="de-DE"/>
+              </a:p>
+            </p:txBody>
+          </p:sp>
+        </mc:Fallback>
+      </mc:AlternateContent>
+      <p:sp>
+        <p:nvSpPr>
+          <p:cNvPr id="4" name="Foliennummernplatzhalter 3"/>
+          <p:cNvSpPr>
+            <a:spLocks noGrp="1"/>
+          </p:cNvSpPr>
+          <p:nvPr>
+            <p:ph type="sldNum" sz="quarter" idx="5"/>
+          </p:nvPr>
+        </p:nvSpPr>
+        <p:spPr/>
+        <p:txBody>
+          <a:bodyPr/>
+          <a:lstStyle/>
+          <a:p>
+            <a:fld id="{416FB7CF-276F-45FE-92E9-289D7174B126}" type="slidenum">
+              <a:rPr lang="de-DE" smtClean="0"/>
+              <a:t>20</a:t>
+            </a:fld>
+            <a:endParaRPr lang="de-DE"/>
+          </a:p>
+        </p:txBody>
+      </p:sp>
+    </p:spTree>
+    <p:extLst>
+      <p:ext uri="{BB962C8B-B14F-4D97-AF65-F5344CB8AC3E}">
+        <p14:creationId xmlns:p14="http://schemas.microsoft.com/office/powerpoint/2010/main" val="4017237063"/>
+      </p:ext>
+    </p:extLst>
+  </p:cSld>
+  <p:clrMapOvr>
+    <a:masterClrMapping/>
+  </p:clrMapOvr>
+</p:notes>
+</file>
+
+<file path=ppt/notesSlides/notesSlide13.xml><?xml version="1.0" encoding="utf-8"?>
+<p:notes xmlns:a="http://schemas.openxmlformats.org/drawingml/2006/main" xmlns:r="http://schemas.openxmlformats.org/officeDocument/2006/relationships" xmlns:p="http://schemas.openxmlformats.org/presentationml/2006/main">
+  <p:cSld>
+    <p:spTree>
+      <p:nvGrpSpPr>
+        <p:cNvPr id="1" name=""/>
+        <p:cNvGrpSpPr/>
+        <p:nvPr/>
+      </p:nvGrpSpPr>
+      <p:grpSpPr>
+        <a:xfrm>
+          <a:off x="0" y="0"/>
+          <a:ext cx="0" cy="0"/>
+          <a:chOff x="0" y="0"/>
+          <a:chExt cx="0" cy="0"/>
+        </a:xfrm>
+      </p:grpSpPr>
+      <p:sp>
+        <p:nvSpPr>
+          <p:cNvPr id="2" name="Folienbildplatzhalter 1"/>
+          <p:cNvSpPr>
+            <a:spLocks noGrp="1" noRot="1" noChangeAspect="1"/>
+          </p:cNvSpPr>
+          <p:nvPr>
+            <p:ph type="sldImg"/>
+          </p:nvPr>
+        </p:nvSpPr>
+        <p:spPr/>
+      </p:sp>
+      <mc:AlternateContent xmlns:mc="http://schemas.openxmlformats.org/markup-compatibility/2006" xmlns:a14="http://schemas.microsoft.com/office/drawing/2010/main">
+        <mc:Choice Requires="a14">
+          <p:sp>
+            <p:nvSpPr>
+              <p:cNvPr id="3" name="Notizenplatzhalter 2"/>
+              <p:cNvSpPr>
+                <a:spLocks noGrp="1"/>
+              </p:cNvSpPr>
+              <p:nvPr>
+                <p:ph type="body" idx="1"/>
+              </p:nvPr>
+            </p:nvSpPr>
+            <p:spPr/>
+            <p:txBody>
+              <a:bodyPr/>
+              <a:lstStyle/>
+              <a:p>
+                <a:endParaRPr lang="de-DE"/>
+              </a:p>
+            </p:txBody>
+          </p:sp>
+        </mc:Choice>
+        <mc:Fallback xmlns="">
+          <p:sp>
+            <p:nvSpPr>
+              <p:cNvPr id="3" name="Notizenplatzhalter 2"/>
+              <p:cNvSpPr>
+                <a:spLocks noGrp="1"/>
+              </p:cNvSpPr>
+              <p:nvPr>
+                <p:ph type="body" idx="1"/>
+              </p:nvPr>
+            </p:nvSpPr>
+            <p:spPr/>
+            <p:txBody>
+              <a:bodyPr/>
+              <a:lstStyle/>
+              <a:p>
+                <a:r>
+                  <a:rPr lang="de-DE"/>
+                  <a:t>Even assuming the reality would follow the Kalman Filter‘s model, the process noise </a:t>
+                </a:r>
+                <a:r>
+                  <a:rPr lang="de-DE" b="0" i="0">
+                    <a:latin typeface="Cambria Math" panose="02040503050406030204" pitchFamily="18" charset="0"/>
+                  </a:rPr>
+                  <a:t>𝑤_𝑘</a:t>
+                </a:r>
+                <a:r>
+                  <a:rPr lang="de-DE"/>
+                  <a:t> makes it necessary</a:t>
+                </a:r>
+                <a:r>
+                  <a:rPr lang="de-DE" baseline="0"/>
+                  <a:t> to use a filter instead of running the equation over and over…</a:t>
+                </a:r>
+                <a:endParaRPr lang="de-DE"/>
+              </a:p>
+            </p:txBody>
+          </p:sp>
+        </mc:Fallback>
+      </mc:AlternateContent>
+      <p:sp>
+        <p:nvSpPr>
+          <p:cNvPr id="4" name="Foliennummernplatzhalter 3"/>
+          <p:cNvSpPr>
+            <a:spLocks noGrp="1"/>
+          </p:cNvSpPr>
+          <p:nvPr>
+            <p:ph type="sldNum" sz="quarter" idx="5"/>
+          </p:nvPr>
+        </p:nvSpPr>
+        <p:spPr/>
+        <p:txBody>
+          <a:bodyPr/>
+          <a:lstStyle/>
+          <a:p>
+            <a:fld id="{416FB7CF-276F-45FE-92E9-289D7174B126}" type="slidenum">
+              <a:rPr lang="de-DE" smtClean="0"/>
+              <a:t>21</a:t>
+            </a:fld>
+            <a:endParaRPr lang="de-DE"/>
+          </a:p>
+        </p:txBody>
+      </p:sp>
+    </p:spTree>
+    <p:extLst>
+      <p:ext uri="{BB962C8B-B14F-4D97-AF65-F5344CB8AC3E}">
+        <p14:creationId xmlns:p14="http://schemas.microsoft.com/office/powerpoint/2010/main" val="705644711"/>
+      </p:ext>
+    </p:extLst>
+  </p:cSld>
+  <p:clrMapOvr>
+    <a:masterClrMapping/>
+  </p:clrMapOvr>
+</p:notes>
+</file>
+
+<file path=ppt/notesSlides/notesSlide14.xml><?xml version="1.0" encoding="utf-8"?>
+<p:notes xmlns:a="http://schemas.openxmlformats.org/drawingml/2006/main" xmlns:r="http://schemas.openxmlformats.org/officeDocument/2006/relationships" xmlns:p="http://schemas.openxmlformats.org/presentationml/2006/main">
+  <p:cSld>
+    <p:spTree>
+      <p:nvGrpSpPr>
+        <p:cNvPr id="1" name=""/>
+        <p:cNvGrpSpPr/>
+        <p:nvPr/>
+      </p:nvGrpSpPr>
+      <p:grpSpPr>
+        <a:xfrm>
+          <a:off x="0" y="0"/>
+          <a:ext cx="0" cy="0"/>
+          <a:chOff x="0" y="0"/>
+          <a:chExt cx="0" cy="0"/>
+        </a:xfrm>
+      </p:grpSpPr>
+      <p:sp>
+        <p:nvSpPr>
+          <p:cNvPr id="2" name="Folienbildplatzhalter 1"/>
+          <p:cNvSpPr>
+            <a:spLocks noGrp="1" noRot="1" noChangeAspect="1"/>
+          </p:cNvSpPr>
+          <p:nvPr>
+            <p:ph type="sldImg"/>
+          </p:nvPr>
+        </p:nvSpPr>
+        <p:spPr/>
+      </p:sp>
+      <mc:AlternateContent xmlns:mc="http://schemas.openxmlformats.org/markup-compatibility/2006" xmlns:a14="http://schemas.microsoft.com/office/drawing/2010/main">
+        <mc:Choice Requires="a14">
+          <p:sp>
+            <p:nvSpPr>
+              <p:cNvPr id="3" name="Notizenplatzhalter 2"/>
+              <p:cNvSpPr>
+                <a:spLocks noGrp="1"/>
+              </p:cNvSpPr>
+              <p:nvPr>
+                <p:ph type="body" idx="1"/>
+              </p:nvPr>
+            </p:nvSpPr>
+            <p:spPr/>
+            <p:txBody>
+              <a:bodyPr/>
+              <a:lstStyle/>
+              <a:p>
                 <a:endParaRPr lang="de-DE"/>
               </a:p>
             </p:txBody>
@@ -688,6 +1238,93 @@
     <p:extLst>
       <p:ext uri="{BB962C8B-B14F-4D97-AF65-F5344CB8AC3E}">
         <p14:creationId xmlns:p14="http://schemas.microsoft.com/office/powerpoint/2010/main" val="389925108"/>
+      </p:ext>
+    </p:extLst>
+  </p:cSld>
+  <p:clrMapOvr>
+    <a:masterClrMapping/>
+  </p:clrMapOvr>
+</p:notes>
+</file>
+
+<file path=ppt/notesSlides/notesSlide15.xml><?xml version="1.0" encoding="utf-8"?>
+<p:notes xmlns:a="http://schemas.openxmlformats.org/drawingml/2006/main" xmlns:r="http://schemas.openxmlformats.org/officeDocument/2006/relationships" xmlns:p="http://schemas.openxmlformats.org/presentationml/2006/main">
+  <p:cSld>
+    <p:spTree>
+      <p:nvGrpSpPr>
+        <p:cNvPr id="1" name=""/>
+        <p:cNvGrpSpPr/>
+        <p:nvPr/>
+      </p:nvGrpSpPr>
+      <p:grpSpPr>
+        <a:xfrm>
+          <a:off x="0" y="0"/>
+          <a:ext cx="0" cy="0"/>
+          <a:chOff x="0" y="0"/>
+          <a:chExt cx="0" cy="0"/>
+        </a:xfrm>
+      </p:grpSpPr>
+      <p:sp>
+        <p:nvSpPr>
+          <p:cNvPr id="2" name="Folienbildplatzhalter 1"/>
+          <p:cNvSpPr>
+            <a:spLocks noGrp="1" noRot="1" noChangeAspect="1"/>
+          </p:cNvSpPr>
+          <p:nvPr>
+            <p:ph type="sldImg"/>
+          </p:nvPr>
+        </p:nvSpPr>
+        <p:spPr/>
+      </p:sp>
+      <p:sp>
+        <p:nvSpPr>
+          <p:cNvPr id="3" name="Notizenplatzhalter 2"/>
+          <p:cNvSpPr>
+            <a:spLocks noGrp="1"/>
+          </p:cNvSpPr>
+          <p:nvPr>
+            <p:ph type="body" idx="1"/>
+          </p:nvPr>
+        </p:nvSpPr>
+        <p:spPr/>
+        <p:txBody>
+          <a:bodyPr/>
+          <a:lstStyle/>
+          <a:p>
+            <a:r>
+              <a:rPr lang="de-DE"/>
+              <a:t>i would like to try you in detail</a:t>
+            </a:r>
+          </a:p>
+        </p:txBody>
+      </p:sp>
+      <p:sp>
+        <p:nvSpPr>
+          <p:cNvPr id="4" name="Foliennummernplatzhalter 3"/>
+          <p:cNvSpPr>
+            <a:spLocks noGrp="1"/>
+          </p:cNvSpPr>
+          <p:nvPr>
+            <p:ph type="sldNum" sz="quarter" idx="5"/>
+          </p:nvPr>
+        </p:nvSpPr>
+        <p:spPr/>
+        <p:txBody>
+          <a:bodyPr/>
+          <a:lstStyle/>
+          <a:p>
+            <a:fld id="{416FB7CF-276F-45FE-92E9-289D7174B126}" type="slidenum">
+              <a:rPr lang="de-DE" smtClean="0"/>
+              <a:t>23</a:t>
+            </a:fld>
+            <a:endParaRPr lang="de-DE"/>
+          </a:p>
+        </p:txBody>
+      </p:sp>
+    </p:spTree>
+    <p:extLst>
+      <p:ext uri="{BB962C8B-B14F-4D97-AF65-F5344CB8AC3E}">
+        <p14:creationId xmlns:p14="http://schemas.microsoft.com/office/powerpoint/2010/main" val="1107687258"/>
       </p:ext>
     </p:extLst>
   </p:cSld>
@@ -936,6 +1573,356 @@
           <a:p>
             <a:fld id="{416FB7CF-276F-45FE-92E9-289D7174B126}" type="slidenum">
               <a:rPr lang="de-DE" smtClean="0"/>
+              <a:t>7</a:t>
+            </a:fld>
+            <a:endParaRPr lang="de-DE"/>
+          </a:p>
+        </p:txBody>
+      </p:sp>
+    </p:spTree>
+    <p:extLst>
+      <p:ext uri="{BB962C8B-B14F-4D97-AF65-F5344CB8AC3E}">
+        <p14:creationId xmlns:p14="http://schemas.microsoft.com/office/powerpoint/2010/main" val="1675050732"/>
+      </p:ext>
+    </p:extLst>
+  </p:cSld>
+  <p:clrMapOvr>
+    <a:masterClrMapping/>
+  </p:clrMapOvr>
+</p:notes>
+</file>
+
+<file path=ppt/notesSlides/notesSlide5.xml><?xml version="1.0" encoding="utf-8"?>
+<p:notes xmlns:a="http://schemas.openxmlformats.org/drawingml/2006/main" xmlns:r="http://schemas.openxmlformats.org/officeDocument/2006/relationships" xmlns:p="http://schemas.openxmlformats.org/presentationml/2006/main">
+  <p:cSld>
+    <p:spTree>
+      <p:nvGrpSpPr>
+        <p:cNvPr id="1" name=""/>
+        <p:cNvGrpSpPr/>
+        <p:nvPr/>
+      </p:nvGrpSpPr>
+      <p:grpSpPr>
+        <a:xfrm>
+          <a:off x="0" y="0"/>
+          <a:ext cx="0" cy="0"/>
+          <a:chOff x="0" y="0"/>
+          <a:chExt cx="0" cy="0"/>
+        </a:xfrm>
+      </p:grpSpPr>
+      <p:sp>
+        <p:nvSpPr>
+          <p:cNvPr id="2" name="Folienbildplatzhalter 1"/>
+          <p:cNvSpPr>
+            <a:spLocks noGrp="1" noRot="1" noChangeAspect="1"/>
+          </p:cNvSpPr>
+          <p:nvPr>
+            <p:ph type="sldImg"/>
+          </p:nvPr>
+        </p:nvSpPr>
+        <p:spPr/>
+      </p:sp>
+      <p:sp>
+        <p:nvSpPr>
+          <p:cNvPr id="3" name="Notizenplatzhalter 2"/>
+          <p:cNvSpPr>
+            <a:spLocks noGrp="1"/>
+          </p:cNvSpPr>
+          <p:nvPr>
+            <p:ph type="body" idx="1"/>
+          </p:nvPr>
+        </p:nvSpPr>
+        <p:spPr/>
+        <p:txBody>
+          <a:bodyPr/>
+          <a:lstStyle/>
+          <a:p>
+            <a:r>
+              <a:rPr lang="de-DE"/>
+              <a:t>discrete timesteps, pos &amp; vel</a:t>
+            </a:r>
+          </a:p>
+        </p:txBody>
+      </p:sp>
+      <p:sp>
+        <p:nvSpPr>
+          <p:cNvPr id="4" name="Foliennummernplatzhalter 3"/>
+          <p:cNvSpPr>
+            <a:spLocks noGrp="1"/>
+          </p:cNvSpPr>
+          <p:nvPr>
+            <p:ph type="sldNum" sz="quarter" idx="5"/>
+          </p:nvPr>
+        </p:nvSpPr>
+        <p:spPr/>
+        <p:txBody>
+          <a:bodyPr/>
+          <a:lstStyle/>
+          <a:p>
+            <a:fld id="{416FB7CF-276F-45FE-92E9-289D7174B126}" type="slidenum">
+              <a:rPr lang="de-DE" smtClean="0"/>
+              <a:t>8</a:t>
+            </a:fld>
+            <a:endParaRPr lang="de-DE"/>
+          </a:p>
+        </p:txBody>
+      </p:sp>
+    </p:spTree>
+    <p:extLst>
+      <p:ext uri="{BB962C8B-B14F-4D97-AF65-F5344CB8AC3E}">
+        <p14:creationId xmlns:p14="http://schemas.microsoft.com/office/powerpoint/2010/main" val="2828974880"/>
+      </p:ext>
+    </p:extLst>
+  </p:cSld>
+  <p:clrMapOvr>
+    <a:masterClrMapping/>
+  </p:clrMapOvr>
+</p:notes>
+</file>
+
+<file path=ppt/notesSlides/notesSlide6.xml><?xml version="1.0" encoding="utf-8"?>
+<p:notes xmlns:a="http://schemas.openxmlformats.org/drawingml/2006/main" xmlns:r="http://schemas.openxmlformats.org/officeDocument/2006/relationships" xmlns:p="http://schemas.openxmlformats.org/presentationml/2006/main">
+  <p:cSld>
+    <p:spTree>
+      <p:nvGrpSpPr>
+        <p:cNvPr id="1" name=""/>
+        <p:cNvGrpSpPr/>
+        <p:nvPr/>
+      </p:nvGrpSpPr>
+      <p:grpSpPr>
+        <a:xfrm>
+          <a:off x="0" y="0"/>
+          <a:ext cx="0" cy="0"/>
+          <a:chOff x="0" y="0"/>
+          <a:chExt cx="0" cy="0"/>
+        </a:xfrm>
+      </p:grpSpPr>
+      <p:sp>
+        <p:nvSpPr>
+          <p:cNvPr id="2" name="Folienbildplatzhalter 1"/>
+          <p:cNvSpPr>
+            <a:spLocks noGrp="1" noRot="1" noChangeAspect="1"/>
+          </p:cNvSpPr>
+          <p:nvPr>
+            <p:ph type="sldImg"/>
+          </p:nvPr>
+        </p:nvSpPr>
+        <p:spPr/>
+      </p:sp>
+      <p:sp>
+        <p:nvSpPr>
+          <p:cNvPr id="3" name="Notizenplatzhalter 2"/>
+          <p:cNvSpPr>
+            <a:spLocks noGrp="1"/>
+          </p:cNvSpPr>
+          <p:nvPr>
+            <p:ph type="body" idx="1"/>
+          </p:nvPr>
+        </p:nvSpPr>
+        <p:spPr/>
+        <p:txBody>
+          <a:bodyPr/>
+          <a:lstStyle/>
+          <a:p>
+            <a:r>
+              <a:rPr lang="de-DE"/>
+              <a:t>at end -&gt; </a:t>
+            </a:r>
+            <a:r>
+              <a:rPr lang="de-DE" b="1"/>
+              <a:t>simulation</a:t>
+            </a:r>
+            <a:endParaRPr lang="de-DE"/>
+          </a:p>
+        </p:txBody>
+      </p:sp>
+      <p:sp>
+        <p:nvSpPr>
+          <p:cNvPr id="4" name="Foliennummernplatzhalter 3"/>
+          <p:cNvSpPr>
+            <a:spLocks noGrp="1"/>
+          </p:cNvSpPr>
+          <p:nvPr>
+            <p:ph type="sldNum" sz="quarter" idx="5"/>
+          </p:nvPr>
+        </p:nvSpPr>
+        <p:spPr/>
+        <p:txBody>
+          <a:bodyPr/>
+          <a:lstStyle/>
+          <a:p>
+            <a:fld id="{416FB7CF-276F-45FE-92E9-289D7174B126}" type="slidenum">
+              <a:rPr lang="de-DE" smtClean="0"/>
+              <a:t>9</a:t>
+            </a:fld>
+            <a:endParaRPr lang="de-DE"/>
+          </a:p>
+        </p:txBody>
+      </p:sp>
+    </p:spTree>
+    <p:extLst>
+      <p:ext uri="{BB962C8B-B14F-4D97-AF65-F5344CB8AC3E}">
+        <p14:creationId xmlns:p14="http://schemas.microsoft.com/office/powerpoint/2010/main" val="3799406650"/>
+      </p:ext>
+    </p:extLst>
+  </p:cSld>
+  <p:clrMapOvr>
+    <a:masterClrMapping/>
+  </p:clrMapOvr>
+</p:notes>
+</file>
+
+<file path=ppt/notesSlides/notesSlide7.xml><?xml version="1.0" encoding="utf-8"?>
+<p:notes xmlns:a="http://schemas.openxmlformats.org/drawingml/2006/main" xmlns:r="http://schemas.openxmlformats.org/officeDocument/2006/relationships" xmlns:p="http://schemas.openxmlformats.org/presentationml/2006/main">
+  <p:cSld>
+    <p:spTree>
+      <p:nvGrpSpPr>
+        <p:cNvPr id="1" name=""/>
+        <p:cNvGrpSpPr/>
+        <p:nvPr/>
+      </p:nvGrpSpPr>
+      <p:grpSpPr>
+        <a:xfrm>
+          <a:off x="0" y="0"/>
+          <a:ext cx="0" cy="0"/>
+          <a:chOff x="0" y="0"/>
+          <a:chExt cx="0" cy="0"/>
+        </a:xfrm>
+      </p:grpSpPr>
+      <p:sp>
+        <p:nvSpPr>
+          <p:cNvPr id="2" name="Folienbildplatzhalter 1"/>
+          <p:cNvSpPr>
+            <a:spLocks noGrp="1" noRot="1" noChangeAspect="1"/>
+          </p:cNvSpPr>
+          <p:nvPr>
+            <p:ph type="sldImg"/>
+          </p:nvPr>
+        </p:nvSpPr>
+        <p:spPr/>
+      </p:sp>
+      <p:sp>
+        <p:nvSpPr>
+          <p:cNvPr id="3" name="Notizenplatzhalter 2"/>
+          <p:cNvSpPr>
+            <a:spLocks noGrp="1"/>
+          </p:cNvSpPr>
+          <p:nvPr>
+            <p:ph type="body" idx="1"/>
+          </p:nvPr>
+        </p:nvSpPr>
+        <p:spPr/>
+        <p:txBody>
+          <a:bodyPr/>
+          <a:lstStyle/>
+          <a:p>
+            <a:r>
+              <a:rPr lang="de-DE"/>
+              <a:t>before i transition to kalman filter, H M M</a:t>
+            </a:r>
+          </a:p>
+        </p:txBody>
+      </p:sp>
+      <p:sp>
+        <p:nvSpPr>
+          <p:cNvPr id="4" name="Foliennummernplatzhalter 3"/>
+          <p:cNvSpPr>
+            <a:spLocks noGrp="1"/>
+          </p:cNvSpPr>
+          <p:nvPr>
+            <p:ph type="sldNum" sz="quarter" idx="5"/>
+          </p:nvPr>
+        </p:nvSpPr>
+        <p:spPr/>
+        <p:txBody>
+          <a:bodyPr/>
+          <a:lstStyle/>
+          <a:p>
+            <a:fld id="{416FB7CF-276F-45FE-92E9-289D7174B126}" type="slidenum">
+              <a:rPr lang="de-DE" smtClean="0"/>
+              <a:t>10</a:t>
+            </a:fld>
+            <a:endParaRPr lang="de-DE"/>
+          </a:p>
+        </p:txBody>
+      </p:sp>
+    </p:spTree>
+    <p:extLst>
+      <p:ext uri="{BB962C8B-B14F-4D97-AF65-F5344CB8AC3E}">
+        <p14:creationId xmlns:p14="http://schemas.microsoft.com/office/powerpoint/2010/main" val="622022499"/>
+      </p:ext>
+    </p:extLst>
+  </p:cSld>
+  <p:clrMapOvr>
+    <a:masterClrMapping/>
+  </p:clrMapOvr>
+</p:notes>
+</file>
+
+<file path=ppt/notesSlides/notesSlide8.xml><?xml version="1.0" encoding="utf-8"?>
+<p:notes xmlns:a="http://schemas.openxmlformats.org/drawingml/2006/main" xmlns:r="http://schemas.openxmlformats.org/officeDocument/2006/relationships" xmlns:p="http://schemas.openxmlformats.org/presentationml/2006/main">
+  <p:cSld>
+    <p:spTree>
+      <p:nvGrpSpPr>
+        <p:cNvPr id="1" name=""/>
+        <p:cNvGrpSpPr/>
+        <p:nvPr/>
+      </p:nvGrpSpPr>
+      <p:grpSpPr>
+        <a:xfrm>
+          <a:off x="0" y="0"/>
+          <a:ext cx="0" cy="0"/>
+          <a:chOff x="0" y="0"/>
+          <a:chExt cx="0" cy="0"/>
+        </a:xfrm>
+      </p:grpSpPr>
+      <p:sp>
+        <p:nvSpPr>
+          <p:cNvPr id="2" name="Folienbildplatzhalter 1"/>
+          <p:cNvSpPr>
+            <a:spLocks noGrp="1" noRot="1" noChangeAspect="1"/>
+          </p:cNvSpPr>
+          <p:nvPr>
+            <p:ph type="sldImg"/>
+          </p:nvPr>
+        </p:nvSpPr>
+        <p:spPr/>
+      </p:sp>
+      <p:sp>
+        <p:nvSpPr>
+          <p:cNvPr id="3" name="Notizenplatzhalter 2"/>
+          <p:cNvSpPr>
+            <a:spLocks noGrp="1"/>
+          </p:cNvSpPr>
+          <p:nvPr>
+            <p:ph type="body" idx="1"/>
+          </p:nvPr>
+        </p:nvSpPr>
+        <p:spPr/>
+        <p:txBody>
+          <a:bodyPr/>
+          <a:lstStyle/>
+          <a:p>
+            <a:endParaRPr lang="de-DE"/>
+          </a:p>
+        </p:txBody>
+      </p:sp>
+      <p:sp>
+        <p:nvSpPr>
+          <p:cNvPr id="4" name="Foliennummernplatzhalter 3"/>
+          <p:cNvSpPr>
+            <a:spLocks noGrp="1"/>
+          </p:cNvSpPr>
+          <p:nvPr>
+            <p:ph type="sldNum" sz="quarter" idx="5"/>
+          </p:nvPr>
+        </p:nvSpPr>
+        <p:spPr/>
+        <p:txBody>
+          <a:bodyPr/>
+          <a:lstStyle/>
+          <a:p>
+            <a:fld id="{416FB7CF-276F-45FE-92E9-289D7174B126}" type="slidenum">
+              <a:rPr lang="de-DE" smtClean="0"/>
               <a:t>11</a:t>
             </a:fld>
             <a:endParaRPr lang="de-DE"/>
@@ -955,7 +1942,7 @@
 </p:notes>
 </file>
 
-<file path=ppt/notesSlides/notesSlide5.xml><?xml version="1.0" encoding="utf-8"?>
+<file path=ppt/notesSlides/notesSlide9.xml><?xml version="1.0" encoding="utf-8"?>
 <p:notes xmlns:a="http://schemas.openxmlformats.org/drawingml/2006/main" xmlns:r="http://schemas.openxmlformats.org/officeDocument/2006/relationships" xmlns:p="http://schemas.openxmlformats.org/presentationml/2006/main">
   <p:cSld>
     <p:spTree>
@@ -1123,555 +2110,6 @@
 </p:notes>
 </file>
 
-<file path=ppt/notesSlides/notesSlide6.xml><?xml version="1.0" encoding="utf-8"?>
-<p:notes xmlns:a="http://schemas.openxmlformats.org/drawingml/2006/main" xmlns:r="http://schemas.openxmlformats.org/officeDocument/2006/relationships" xmlns:p="http://schemas.openxmlformats.org/presentationml/2006/main">
-  <p:cSld>
-    <p:spTree>
-      <p:nvGrpSpPr>
-        <p:cNvPr id="1" name=""/>
-        <p:cNvGrpSpPr/>
-        <p:nvPr/>
-      </p:nvGrpSpPr>
-      <p:grpSpPr>
-        <a:xfrm>
-          <a:off x="0" y="0"/>
-          <a:ext cx="0" cy="0"/>
-          <a:chOff x="0" y="0"/>
-          <a:chExt cx="0" cy="0"/>
-        </a:xfrm>
-      </p:grpSpPr>
-      <p:sp>
-        <p:nvSpPr>
-          <p:cNvPr id="2" name="Folienbildplatzhalter 1"/>
-          <p:cNvSpPr>
-            <a:spLocks noGrp="1" noRot="1" noChangeAspect="1"/>
-          </p:cNvSpPr>
-          <p:nvPr>
-            <p:ph type="sldImg"/>
-          </p:nvPr>
-        </p:nvSpPr>
-        <p:spPr/>
-      </p:sp>
-      <mc:AlternateContent xmlns:mc="http://schemas.openxmlformats.org/markup-compatibility/2006" xmlns:a14="http://schemas.microsoft.com/office/drawing/2010/main">
-        <mc:Choice Requires="a14">
-          <p:sp>
-            <p:nvSpPr>
-              <p:cNvPr id="3" name="Notizenplatzhalter 2"/>
-              <p:cNvSpPr>
-                <a:spLocks noGrp="1"/>
-              </p:cNvSpPr>
-              <p:nvPr>
-                <p:ph type="body" idx="1"/>
-              </p:nvPr>
-            </p:nvSpPr>
-            <p:spPr/>
-            <p:txBody>
-              <a:bodyPr/>
-              <a:lstStyle/>
-              <a:p>
-                <a:r>
-                  <a:rPr lang="de-DE"/>
-                  <a:t>Even assuming the reality would follow the Kalman Filter‘s model, the process noise </a:t>
-                </a:r>
-                <a14:m>
-                  <m:oMath xmlns:m="http://schemas.openxmlformats.org/officeDocument/2006/math">
-                    <m:sSub>
-                      <m:sSubPr>
-                        <m:ctrlPr>
-                          <a:rPr lang="de-DE" b="0" i="1" smtClean="0">
-                            <a:latin typeface="Cambria Math" panose="02040503050406030204" pitchFamily="18" charset="0"/>
-                          </a:rPr>
-                        </m:ctrlPr>
-                      </m:sSubPr>
-                      <m:e>
-                        <m:r>
-                          <a:rPr lang="de-DE" b="0" i="1" smtClean="0">
-                            <a:latin typeface="Cambria Math" panose="02040503050406030204" pitchFamily="18" charset="0"/>
-                          </a:rPr>
-                          <m:t>𝑤</m:t>
-                        </m:r>
-                      </m:e>
-                      <m:sub>
-                        <m:r>
-                          <a:rPr lang="de-DE" b="0" i="1" smtClean="0">
-                            <a:latin typeface="Cambria Math" panose="02040503050406030204" pitchFamily="18" charset="0"/>
-                          </a:rPr>
-                          <m:t>𝑘</m:t>
-                        </m:r>
-                      </m:sub>
-                    </m:sSub>
-                  </m:oMath>
-                </a14:m>
-                <a:r>
-                  <a:rPr lang="de-DE"/>
-                  <a:t> makes it necessary</a:t>
-                </a:r>
-                <a:r>
-                  <a:rPr lang="de-DE" baseline="0"/>
-                  <a:t> to use a filter instead of running the equation over and over…</a:t>
-                </a:r>
-                <a:endParaRPr lang="de-DE"/>
-              </a:p>
-            </p:txBody>
-          </p:sp>
-        </mc:Choice>
-        <mc:Fallback xmlns="">
-          <p:sp>
-            <p:nvSpPr>
-              <p:cNvPr id="3" name="Notizenplatzhalter 2"/>
-              <p:cNvSpPr>
-                <a:spLocks noGrp="1"/>
-              </p:cNvSpPr>
-              <p:nvPr>
-                <p:ph type="body" idx="1"/>
-              </p:nvPr>
-            </p:nvSpPr>
-            <p:spPr/>
-            <p:txBody>
-              <a:bodyPr/>
-              <a:lstStyle/>
-              <a:p>
-                <a:r>
-                  <a:rPr lang="de-DE"/>
-                  <a:t>Even assuming the reality would follow the Kalman Filter‘s model, the process noise </a:t>
-                </a:r>
-                <a:r>
-                  <a:rPr lang="de-DE" b="0" i="0">
-                    <a:latin typeface="Cambria Math" panose="02040503050406030204" pitchFamily="18" charset="0"/>
-                  </a:rPr>
-                  <a:t>𝑤_𝑘</a:t>
-                </a:r>
-                <a:r>
-                  <a:rPr lang="de-DE"/>
-                  <a:t> makes it necessary</a:t>
-                </a:r>
-                <a:r>
-                  <a:rPr lang="de-DE" baseline="0"/>
-                  <a:t> to use a filter instead of running the equation over and over…</a:t>
-                </a:r>
-                <a:endParaRPr lang="de-DE"/>
-              </a:p>
-            </p:txBody>
-          </p:sp>
-        </mc:Fallback>
-      </mc:AlternateContent>
-      <p:sp>
-        <p:nvSpPr>
-          <p:cNvPr id="4" name="Foliennummernplatzhalter 3"/>
-          <p:cNvSpPr>
-            <a:spLocks noGrp="1"/>
-          </p:cNvSpPr>
-          <p:nvPr>
-            <p:ph type="sldNum" sz="quarter" idx="5"/>
-          </p:nvPr>
-        </p:nvSpPr>
-        <p:spPr/>
-        <p:txBody>
-          <a:bodyPr/>
-          <a:lstStyle/>
-          <a:p>
-            <a:fld id="{416FB7CF-276F-45FE-92E9-289D7174B126}" type="slidenum">
-              <a:rPr lang="de-DE" smtClean="0"/>
-              <a:t>16</a:t>
-            </a:fld>
-            <a:endParaRPr lang="de-DE"/>
-          </a:p>
-        </p:txBody>
-      </p:sp>
-    </p:spTree>
-    <p:extLst>
-      <p:ext uri="{BB962C8B-B14F-4D97-AF65-F5344CB8AC3E}">
-        <p14:creationId xmlns:p14="http://schemas.microsoft.com/office/powerpoint/2010/main" val="3320482346"/>
-      </p:ext>
-    </p:extLst>
-  </p:cSld>
-  <p:clrMapOvr>
-    <a:masterClrMapping/>
-  </p:clrMapOvr>
-</p:notes>
-</file>
-
-<file path=ppt/notesSlides/notesSlide7.xml><?xml version="1.0" encoding="utf-8"?>
-<p:notes xmlns:a="http://schemas.openxmlformats.org/drawingml/2006/main" xmlns:r="http://schemas.openxmlformats.org/officeDocument/2006/relationships" xmlns:p="http://schemas.openxmlformats.org/presentationml/2006/main">
-  <p:cSld>
-    <p:spTree>
-      <p:nvGrpSpPr>
-        <p:cNvPr id="1" name=""/>
-        <p:cNvGrpSpPr/>
-        <p:nvPr/>
-      </p:nvGrpSpPr>
-      <p:grpSpPr>
-        <a:xfrm>
-          <a:off x="0" y="0"/>
-          <a:ext cx="0" cy="0"/>
-          <a:chOff x="0" y="0"/>
-          <a:chExt cx="0" cy="0"/>
-        </a:xfrm>
-      </p:grpSpPr>
-      <p:sp>
-        <p:nvSpPr>
-          <p:cNvPr id="2" name="Folienbildplatzhalter 1"/>
-          <p:cNvSpPr>
-            <a:spLocks noGrp="1" noRot="1" noChangeAspect="1"/>
-          </p:cNvSpPr>
-          <p:nvPr>
-            <p:ph type="sldImg"/>
-          </p:nvPr>
-        </p:nvSpPr>
-        <p:spPr/>
-      </p:sp>
-      <mc:AlternateContent xmlns:mc="http://schemas.openxmlformats.org/markup-compatibility/2006" xmlns:a14="http://schemas.microsoft.com/office/drawing/2010/main">
-        <mc:Choice Requires="a14">
-          <p:sp>
-            <p:nvSpPr>
-              <p:cNvPr id="3" name="Notizenplatzhalter 2"/>
-              <p:cNvSpPr>
-                <a:spLocks noGrp="1"/>
-              </p:cNvSpPr>
-              <p:nvPr>
-                <p:ph type="body" idx="1"/>
-              </p:nvPr>
-            </p:nvSpPr>
-            <p:spPr/>
-            <p:txBody>
-              <a:bodyPr/>
-              <a:lstStyle/>
-              <a:p>
-                <a:endParaRPr lang="de-DE"/>
-              </a:p>
-            </p:txBody>
-          </p:sp>
-        </mc:Choice>
-        <mc:Fallback xmlns="">
-          <p:sp>
-            <p:nvSpPr>
-              <p:cNvPr id="3" name="Notizenplatzhalter 2"/>
-              <p:cNvSpPr>
-                <a:spLocks noGrp="1"/>
-              </p:cNvSpPr>
-              <p:nvPr>
-                <p:ph type="body" idx="1"/>
-              </p:nvPr>
-            </p:nvSpPr>
-            <p:spPr/>
-            <p:txBody>
-              <a:bodyPr/>
-              <a:lstStyle/>
-              <a:p>
-                <a:r>
-                  <a:rPr lang="de-DE"/>
-                  <a:t>Even assuming the reality would follow the Kalman Filter‘s model, the process noise </a:t>
-                </a:r>
-                <a:r>
-                  <a:rPr lang="de-DE" b="0" i="0">
-                    <a:latin typeface="Cambria Math" panose="02040503050406030204" pitchFamily="18" charset="0"/>
-                  </a:rPr>
-                  <a:t>𝑤_𝑘</a:t>
-                </a:r>
-                <a:r>
-                  <a:rPr lang="de-DE"/>
-                  <a:t> makes it necessary</a:t>
-                </a:r>
-                <a:r>
-                  <a:rPr lang="de-DE" baseline="0"/>
-                  <a:t> to use a filter instead of running the equation over and over…</a:t>
-                </a:r>
-                <a:endParaRPr lang="de-DE"/>
-              </a:p>
-            </p:txBody>
-          </p:sp>
-        </mc:Fallback>
-      </mc:AlternateContent>
-      <p:sp>
-        <p:nvSpPr>
-          <p:cNvPr id="4" name="Foliennummernplatzhalter 3"/>
-          <p:cNvSpPr>
-            <a:spLocks noGrp="1"/>
-          </p:cNvSpPr>
-          <p:nvPr>
-            <p:ph type="sldNum" sz="quarter" idx="5"/>
-          </p:nvPr>
-        </p:nvSpPr>
-        <p:spPr/>
-        <p:txBody>
-          <a:bodyPr/>
-          <a:lstStyle/>
-          <a:p>
-            <a:fld id="{416FB7CF-276F-45FE-92E9-289D7174B126}" type="slidenum">
-              <a:rPr lang="de-DE" smtClean="0"/>
-              <a:t>19</a:t>
-            </a:fld>
-            <a:endParaRPr lang="de-DE"/>
-          </a:p>
-        </p:txBody>
-      </p:sp>
-    </p:spTree>
-    <p:extLst>
-      <p:ext uri="{BB962C8B-B14F-4D97-AF65-F5344CB8AC3E}">
-        <p14:creationId xmlns:p14="http://schemas.microsoft.com/office/powerpoint/2010/main" val="4252002354"/>
-      </p:ext>
-    </p:extLst>
-  </p:cSld>
-  <p:clrMapOvr>
-    <a:masterClrMapping/>
-  </p:clrMapOvr>
-</p:notes>
-</file>
-
-<file path=ppt/notesSlides/notesSlide8.xml><?xml version="1.0" encoding="utf-8"?>
-<p:notes xmlns:a="http://schemas.openxmlformats.org/drawingml/2006/main" xmlns:r="http://schemas.openxmlformats.org/officeDocument/2006/relationships" xmlns:p="http://schemas.openxmlformats.org/presentationml/2006/main">
-  <p:cSld>
-    <p:spTree>
-      <p:nvGrpSpPr>
-        <p:cNvPr id="1" name=""/>
-        <p:cNvGrpSpPr/>
-        <p:nvPr/>
-      </p:nvGrpSpPr>
-      <p:grpSpPr>
-        <a:xfrm>
-          <a:off x="0" y="0"/>
-          <a:ext cx="0" cy="0"/>
-          <a:chOff x="0" y="0"/>
-          <a:chExt cx="0" cy="0"/>
-        </a:xfrm>
-      </p:grpSpPr>
-      <p:sp>
-        <p:nvSpPr>
-          <p:cNvPr id="2" name="Folienbildplatzhalter 1"/>
-          <p:cNvSpPr>
-            <a:spLocks noGrp="1" noRot="1" noChangeAspect="1"/>
-          </p:cNvSpPr>
-          <p:nvPr>
-            <p:ph type="sldImg"/>
-          </p:nvPr>
-        </p:nvSpPr>
-        <p:spPr/>
-      </p:sp>
-      <mc:AlternateContent xmlns:mc="http://schemas.openxmlformats.org/markup-compatibility/2006" xmlns:a14="http://schemas.microsoft.com/office/drawing/2010/main">
-        <mc:Choice Requires="a14">
-          <p:sp>
-            <p:nvSpPr>
-              <p:cNvPr id="3" name="Notizenplatzhalter 2"/>
-              <p:cNvSpPr>
-                <a:spLocks noGrp="1"/>
-              </p:cNvSpPr>
-              <p:nvPr>
-                <p:ph type="body" idx="1"/>
-              </p:nvPr>
-            </p:nvSpPr>
-            <p:spPr/>
-            <p:txBody>
-              <a:bodyPr/>
-              <a:lstStyle/>
-              <a:p>
-                <a:endParaRPr lang="de-DE"/>
-              </a:p>
-            </p:txBody>
-          </p:sp>
-        </mc:Choice>
-        <mc:Fallback xmlns="">
-          <p:sp>
-            <p:nvSpPr>
-              <p:cNvPr id="3" name="Notizenplatzhalter 2"/>
-              <p:cNvSpPr>
-                <a:spLocks noGrp="1"/>
-              </p:cNvSpPr>
-              <p:nvPr>
-                <p:ph type="body" idx="1"/>
-              </p:nvPr>
-            </p:nvSpPr>
-            <p:spPr/>
-            <p:txBody>
-              <a:bodyPr/>
-              <a:lstStyle/>
-              <a:p>
-                <a:r>
-                  <a:rPr lang="de-DE"/>
-                  <a:t>Even assuming the reality would follow the Kalman Filter‘s model, the process noise </a:t>
-                </a:r>
-                <a:r>
-                  <a:rPr lang="de-DE" b="0" i="0">
-                    <a:latin typeface="Cambria Math" panose="02040503050406030204" pitchFamily="18" charset="0"/>
-                  </a:rPr>
-                  <a:t>𝑤_𝑘</a:t>
-                </a:r>
-                <a:r>
-                  <a:rPr lang="de-DE"/>
-                  <a:t> makes it necessary</a:t>
-                </a:r>
-                <a:r>
-                  <a:rPr lang="de-DE" baseline="0"/>
-                  <a:t> to use a filter instead of running the equation over and over…</a:t>
-                </a:r>
-                <a:endParaRPr lang="de-DE"/>
-              </a:p>
-            </p:txBody>
-          </p:sp>
-        </mc:Fallback>
-      </mc:AlternateContent>
-      <p:sp>
-        <p:nvSpPr>
-          <p:cNvPr id="4" name="Foliennummernplatzhalter 3"/>
-          <p:cNvSpPr>
-            <a:spLocks noGrp="1"/>
-          </p:cNvSpPr>
-          <p:nvPr>
-            <p:ph type="sldNum" sz="quarter" idx="5"/>
-          </p:nvPr>
-        </p:nvSpPr>
-        <p:spPr/>
-        <p:txBody>
-          <a:bodyPr/>
-          <a:lstStyle/>
-          <a:p>
-            <a:fld id="{416FB7CF-276F-45FE-92E9-289D7174B126}" type="slidenum">
-              <a:rPr lang="de-DE" smtClean="0"/>
-              <a:t>20</a:t>
-            </a:fld>
-            <a:endParaRPr lang="de-DE"/>
-          </a:p>
-        </p:txBody>
-      </p:sp>
-    </p:spTree>
-    <p:extLst>
-      <p:ext uri="{BB962C8B-B14F-4D97-AF65-F5344CB8AC3E}">
-        <p14:creationId xmlns:p14="http://schemas.microsoft.com/office/powerpoint/2010/main" val="4017237063"/>
-      </p:ext>
-    </p:extLst>
-  </p:cSld>
-  <p:clrMapOvr>
-    <a:masterClrMapping/>
-  </p:clrMapOvr>
-</p:notes>
-</file>
-
-<file path=ppt/notesSlides/notesSlide9.xml><?xml version="1.0" encoding="utf-8"?>
-<p:notes xmlns:a="http://schemas.openxmlformats.org/drawingml/2006/main" xmlns:r="http://schemas.openxmlformats.org/officeDocument/2006/relationships" xmlns:p="http://schemas.openxmlformats.org/presentationml/2006/main">
-  <p:cSld>
-    <p:spTree>
-      <p:nvGrpSpPr>
-        <p:cNvPr id="1" name=""/>
-        <p:cNvGrpSpPr/>
-        <p:nvPr/>
-      </p:nvGrpSpPr>
-      <p:grpSpPr>
-        <a:xfrm>
-          <a:off x="0" y="0"/>
-          <a:ext cx="0" cy="0"/>
-          <a:chOff x="0" y="0"/>
-          <a:chExt cx="0" cy="0"/>
-        </a:xfrm>
-      </p:grpSpPr>
-      <p:sp>
-        <p:nvSpPr>
-          <p:cNvPr id="2" name="Folienbildplatzhalter 1"/>
-          <p:cNvSpPr>
-            <a:spLocks noGrp="1" noRot="1" noChangeAspect="1"/>
-          </p:cNvSpPr>
-          <p:nvPr>
-            <p:ph type="sldImg"/>
-          </p:nvPr>
-        </p:nvSpPr>
-        <p:spPr/>
-      </p:sp>
-      <mc:AlternateContent xmlns:mc="http://schemas.openxmlformats.org/markup-compatibility/2006" xmlns:a14="http://schemas.microsoft.com/office/drawing/2010/main">
-        <mc:Choice Requires="a14">
-          <p:sp>
-            <p:nvSpPr>
-              <p:cNvPr id="3" name="Notizenplatzhalter 2"/>
-              <p:cNvSpPr>
-                <a:spLocks noGrp="1"/>
-              </p:cNvSpPr>
-              <p:nvPr>
-                <p:ph type="body" idx="1"/>
-              </p:nvPr>
-            </p:nvSpPr>
-            <p:spPr/>
-            <p:txBody>
-              <a:bodyPr/>
-              <a:lstStyle/>
-              <a:p>
-                <a:endParaRPr lang="de-DE"/>
-              </a:p>
-            </p:txBody>
-          </p:sp>
-        </mc:Choice>
-        <mc:Fallback xmlns="">
-          <p:sp>
-            <p:nvSpPr>
-              <p:cNvPr id="3" name="Notizenplatzhalter 2"/>
-              <p:cNvSpPr>
-                <a:spLocks noGrp="1"/>
-              </p:cNvSpPr>
-              <p:nvPr>
-                <p:ph type="body" idx="1"/>
-              </p:nvPr>
-            </p:nvSpPr>
-            <p:spPr/>
-            <p:txBody>
-              <a:bodyPr/>
-              <a:lstStyle/>
-              <a:p>
-                <a:r>
-                  <a:rPr lang="de-DE"/>
-                  <a:t>Even assuming the reality would follow the Kalman Filter‘s model, the process noise </a:t>
-                </a:r>
-                <a:r>
-                  <a:rPr lang="de-DE" b="0" i="0">
-                    <a:latin typeface="Cambria Math" panose="02040503050406030204" pitchFamily="18" charset="0"/>
-                  </a:rPr>
-                  <a:t>𝑤_𝑘</a:t>
-                </a:r>
-                <a:r>
-                  <a:rPr lang="de-DE"/>
-                  <a:t> makes it necessary</a:t>
-                </a:r>
-                <a:r>
-                  <a:rPr lang="de-DE" baseline="0"/>
-                  <a:t> to use a filter instead of running the equation over and over…</a:t>
-                </a:r>
-                <a:endParaRPr lang="de-DE"/>
-              </a:p>
-            </p:txBody>
-          </p:sp>
-        </mc:Fallback>
-      </mc:AlternateContent>
-      <p:sp>
-        <p:nvSpPr>
-          <p:cNvPr id="4" name="Foliennummernplatzhalter 3"/>
-          <p:cNvSpPr>
-            <a:spLocks noGrp="1"/>
-          </p:cNvSpPr>
-          <p:nvPr>
-            <p:ph type="sldNum" sz="quarter" idx="5"/>
-          </p:nvPr>
-        </p:nvSpPr>
-        <p:spPr/>
-        <p:txBody>
-          <a:bodyPr/>
-          <a:lstStyle/>
-          <a:p>
-            <a:fld id="{416FB7CF-276F-45FE-92E9-289D7174B126}" type="slidenum">
-              <a:rPr lang="de-DE" smtClean="0"/>
-              <a:t>21</a:t>
-            </a:fld>
-            <a:endParaRPr lang="de-DE"/>
-          </a:p>
-        </p:txBody>
-      </p:sp>
-    </p:spTree>
-    <p:extLst>
-      <p:ext uri="{BB962C8B-B14F-4D97-AF65-F5344CB8AC3E}">
-        <p14:creationId xmlns:p14="http://schemas.microsoft.com/office/powerpoint/2010/main" val="705644711"/>
-      </p:ext>
-    </p:extLst>
-  </p:cSld>
-  <p:clrMapOvr>
-    <a:masterClrMapping/>
-  </p:clrMapOvr>
-</p:notes>
-</file>
-
 <file path=ppt/slideLayouts/slideLayout1.xml><?xml version="1.0" encoding="utf-8"?>
 <p:sldLayout xmlns:a="http://schemas.openxmlformats.org/drawingml/2006/main" xmlns:r="http://schemas.openxmlformats.org/officeDocument/2006/relationships" xmlns:p="http://schemas.openxmlformats.org/presentationml/2006/main" type="title" preserve="1">
   <p:cSld name="Titelfolie">
@@ -1819,7 +2257,7 @@
           <a:p>
             <a:fld id="{0B3785B8-7845-4E22-917D-860CEDD8A158}" type="datetime1">
               <a:rPr lang="de-DE" smtClean="0"/>
-              <a:t>24.09.2018</a:t>
+              <a:t>25.09.2018</a:t>
             </a:fld>
             <a:endParaRPr lang="de-DE"/>
           </a:p>
@@ -2017,7 +2455,7 @@
           <a:p>
             <a:fld id="{3251938C-2909-4BAA-BC07-22B60A122E43}" type="datetime1">
               <a:rPr lang="de-DE" smtClean="0"/>
-              <a:t>24.09.2018</a:t>
+              <a:t>25.09.2018</a:t>
             </a:fld>
             <a:endParaRPr lang="de-DE"/>
           </a:p>
@@ -2225,7 +2663,7 @@
           <a:p>
             <a:fld id="{D187C8ED-4DEB-41FB-A851-C9EF06EC7D47}" type="datetime1">
               <a:rPr lang="de-DE" smtClean="0"/>
-              <a:t>24.09.2018</a:t>
+              <a:t>25.09.2018</a:t>
             </a:fld>
             <a:endParaRPr lang="de-DE"/>
           </a:p>
@@ -2423,7 +2861,7 @@
           <a:p>
             <a:fld id="{97AF0FDE-A463-47AC-AC43-1CDDF8F73A3C}" type="datetime1">
               <a:rPr lang="de-DE" smtClean="0"/>
-              <a:t>24.09.2018</a:t>
+              <a:t>25.09.2018</a:t>
             </a:fld>
             <a:endParaRPr lang="de-DE"/>
           </a:p>
@@ -2698,7 +3136,7 @@
           <a:p>
             <a:fld id="{8AA0F461-126D-497C-998A-502AB75AD3BE}" type="datetime1">
               <a:rPr lang="de-DE" smtClean="0"/>
-              <a:t>24.09.2018</a:t>
+              <a:t>25.09.2018</a:t>
             </a:fld>
             <a:endParaRPr lang="de-DE"/>
           </a:p>
@@ -2963,7 +3401,7 @@
           <a:p>
             <a:fld id="{F72D3A86-22DE-4E91-BF14-9DEAA66C31B9}" type="datetime1">
               <a:rPr lang="de-DE" smtClean="0"/>
-              <a:t>24.09.2018</a:t>
+              <a:t>25.09.2018</a:t>
             </a:fld>
             <a:endParaRPr lang="de-DE"/>
           </a:p>
@@ -3375,7 +3813,7 @@
           <a:p>
             <a:fld id="{39B9B465-A058-4BD0-860F-D81B0F9FBEF4}" type="datetime1">
               <a:rPr lang="de-DE" smtClean="0"/>
-              <a:t>24.09.2018</a:t>
+              <a:t>25.09.2018</a:t>
             </a:fld>
             <a:endParaRPr lang="de-DE"/>
           </a:p>
@@ -3516,7 +3954,7 @@
           <a:p>
             <a:fld id="{A5D87DB6-0037-410E-8516-CB9FDC85B00F}" type="datetime1">
               <a:rPr lang="de-DE" smtClean="0"/>
-              <a:t>24.09.2018</a:t>
+              <a:t>25.09.2018</a:t>
             </a:fld>
             <a:endParaRPr lang="de-DE"/>
           </a:p>
@@ -3629,7 +4067,7 @@
           <a:p>
             <a:fld id="{69BBDC03-799D-4EC8-8311-1AB5FC4EEE0C}" type="datetime1">
               <a:rPr lang="de-DE" smtClean="0"/>
-              <a:t>24.09.2018</a:t>
+              <a:t>25.09.2018</a:t>
             </a:fld>
             <a:endParaRPr lang="de-DE"/>
           </a:p>
@@ -3940,7 +4378,7 @@
           <a:p>
             <a:fld id="{924C3D6F-889B-4CB3-AB5C-6E3290D337C5}" type="datetime1">
               <a:rPr lang="de-DE" smtClean="0"/>
-              <a:t>24.09.2018</a:t>
+              <a:t>25.09.2018</a:t>
             </a:fld>
             <a:endParaRPr lang="de-DE"/>
           </a:p>
@@ -4228,7 +4666,7 @@
           <a:p>
             <a:fld id="{8D06413E-5BD4-4FFF-8354-255E6D3C998B}" type="datetime1">
               <a:rPr lang="de-DE" smtClean="0"/>
-              <a:t>24.09.2018</a:t>
+              <a:t>25.09.2018</a:t>
             </a:fld>
             <a:endParaRPr lang="de-DE"/>
           </a:p>
@@ -4469,7 +4907,7 @@
           <a:p>
             <a:fld id="{96478762-7B63-411B-A736-55CDCD2A8D1A}" type="datetime1">
               <a:rPr lang="de-DE" smtClean="0"/>
-              <a:t>24.09.2018</a:t>
+              <a:t>25.09.2018</a:t>
             </a:fld>
             <a:endParaRPr lang="de-DE"/>
           </a:p>
@@ -4903,13 +5341,20 @@
             <p:ph type="ctrTitle"/>
           </p:nvPr>
         </p:nvSpPr>
-        <p:spPr/>
+        <p:spPr>
+          <a:xfrm>
+            <a:off x="1143000" y="1122363"/>
+            <a:ext cx="6858000" cy="1549816"/>
+          </a:xfrm>
+        </p:spPr>
         <p:txBody>
-          <a:bodyPr/>
+          <a:bodyPr>
+            <a:normAutofit/>
+          </a:bodyPr>
           <a:lstStyle/>
           <a:p>
             <a:r>
-              <a:rPr lang="de-DE"/>
+              <a:rPr lang="de-DE" sz="5400"/>
               <a:t>Kalman-Filter</a:t>
             </a:r>
           </a:p>
@@ -4969,6 +5414,42 @@
           </a:p>
         </p:txBody>
       </p:sp>
+      <p:pic>
+        <p:nvPicPr>
+          <p:cNvPr id="8" name="Grafik 7">
+            <a:extLst>
+              <a:ext uri="{FF2B5EF4-FFF2-40B4-BE49-F238E27FC236}">
+                <a16:creationId xmlns:a16="http://schemas.microsoft.com/office/drawing/2014/main" id="{3A42800D-A649-4CA9-BFCA-1A8D4966AA68}"/>
+              </a:ext>
+            </a:extLst>
+          </p:cNvPr>
+          <p:cNvPicPr>
+            <a:picLocks noChangeAspect="1"/>
+          </p:cNvPicPr>
+          <p:nvPr/>
+        </p:nvPicPr>
+        <p:blipFill>
+          <a:blip r:embed="rId2">
+            <a:extLst>
+              <a:ext uri="{28A0092B-C50C-407E-A947-70E740481C1C}">
+                <a14:useLocalDpi xmlns:a14="http://schemas.microsoft.com/office/drawing/2010/main" val="0"/>
+              </a:ext>
+            </a:extLst>
+          </a:blip>
+          <a:stretch>
+            <a:fillRect/>
+          </a:stretch>
+        </p:blipFill>
+        <p:spPr>
+          <a:xfrm>
+            <a:off x="2290438" y="2890057"/>
+            <a:ext cx="4563123" cy="2796753"/>
+          </a:xfrm>
+          <a:prstGeom prst="rect">
+            <a:avLst/>
+          </a:prstGeom>
+        </p:spPr>
+      </p:pic>
     </p:spTree>
     <p:extLst>
       <p:ext uri="{BB962C8B-B14F-4D97-AF65-F5344CB8AC3E}">
@@ -5022,7 +5503,7 @@
           <p:nvPr/>
         </p:nvPicPr>
         <p:blipFill>
-          <a:blip r:embed="rId2"/>
+          <a:blip r:embed="rId3"/>
           <a:stretch>
             <a:fillRect/>
           </a:stretch>
@@ -5081,7 +5562,7 @@
           <p:nvPr/>
         </p:nvPicPr>
         <p:blipFill rotWithShape="1">
-          <a:blip r:embed="rId3"/>
+          <a:blip r:embed="rId4"/>
           <a:srcRect b="3464"/>
           <a:stretch/>
         </p:blipFill>
@@ -5201,7 +5682,7 @@
                 <a:avLst/>
               </a:prstGeom>
               <a:blipFill>
-                <a:blip r:embed="rId4"/>
+                <a:blip r:embed="rId5"/>
                 <a:stretch>
                   <a:fillRect/>
                 </a:stretch>
@@ -5328,7 +5809,7 @@
                 <a:avLst/>
               </a:prstGeom>
               <a:blipFill>
-                <a:blip r:embed="rId5"/>
+                <a:blip r:embed="rId6"/>
                 <a:stretch>
                   <a:fillRect/>
                 </a:stretch>
@@ -5364,7 +5845,7 @@
           <p:nvPr/>
         </p:nvPicPr>
         <p:blipFill rotWithShape="1">
-          <a:blip r:embed="rId6"/>
+          <a:blip r:embed="rId7"/>
           <a:srcRect l="-1" r="-2556"/>
           <a:stretch/>
         </p:blipFill>
@@ -5506,7 +5987,7 @@
                 <a:ext cx="9144000" cy="1056401"/>
               </a:xfrm>
               <a:blipFill>
-                <a:blip r:embed="rId7"/>
+                <a:blip r:embed="rId8"/>
                 <a:stretch>
                   <a:fillRect t="-13295" b="-24855"/>
                 </a:stretch>
@@ -5639,7 +6120,7 @@
                 <a:avLst/>
               </a:prstGeom>
               <a:blipFill>
-                <a:blip r:embed="rId8"/>
+                <a:blip r:embed="rId9"/>
                 <a:stretch>
                   <a:fillRect/>
                 </a:stretch>
@@ -5675,7 +6156,7 @@
           <p:nvPr/>
         </p:nvPicPr>
         <p:blipFill>
-          <a:blip r:embed="rId9"/>
+          <a:blip r:embed="rId10"/>
           <a:stretch>
             <a:fillRect/>
           </a:stretch>
@@ -5796,7 +6277,7 @@
                 <a:avLst/>
               </a:prstGeom>
               <a:blipFill>
-                <a:blip r:embed="rId10"/>
+                <a:blip r:embed="rId11"/>
                 <a:stretch>
                   <a:fillRect/>
                 </a:stretch>
@@ -5962,7 +6443,7 @@
                 <a:avLst/>
               </a:prstGeom>
               <a:blipFill>
-                <a:blip r:embed="rId11"/>
+                <a:blip r:embed="rId12"/>
                 <a:stretch>
                   <a:fillRect l="-2970" t="-2927" r="-2310"/>
                 </a:stretch>
@@ -11961,8 +12442,8 @@
         </p:nvSpPr>
         <p:spPr>
           <a:xfrm>
-            <a:off x="6817896" y="1144137"/>
-            <a:ext cx="1176219" cy="984885"/>
+            <a:off x="6727390" y="1144137"/>
+            <a:ext cx="1357231" cy="984885"/>
           </a:xfrm>
           <a:prstGeom prst="rect">
             <a:avLst/>
@@ -11983,7 +12464,10 @@
           </a:p>
           <a:p>
             <a:pPr algn="ctr"/>
-            <a:endParaRPr lang="de-DE"/>
+            <a:r>
+              <a:rPr lang="de-DE"/>
+              <a:t>(observable)</a:t>
+            </a:r>
           </a:p>
         </p:txBody>
       </p:sp>
@@ -12387,6 +12871,170 @@
           </a:fontRef>
         </p:style>
       </p:cxnSp>
+      <p:cxnSp>
+        <p:nvCxnSpPr>
+          <p:cNvPr id="23" name="Gerade Verbindung mit Pfeil 22">
+            <a:extLst>
+              <a:ext uri="{FF2B5EF4-FFF2-40B4-BE49-F238E27FC236}">
+                <a16:creationId xmlns:a16="http://schemas.microsoft.com/office/drawing/2014/main" id="{FFD4C4AD-4F46-4943-97D5-1D7CF8D33095}"/>
+              </a:ext>
+            </a:extLst>
+          </p:cNvPr>
+          <p:cNvCxnSpPr/>
+          <p:nvPr/>
+        </p:nvCxnSpPr>
+        <p:spPr>
+          <a:xfrm>
+            <a:off x="390617" y="1251751"/>
+            <a:ext cx="0" cy="5326602"/>
+          </a:xfrm>
+          <a:prstGeom prst="straightConnector1">
+            <a:avLst/>
+          </a:prstGeom>
+          <a:ln w="50800">
+            <a:solidFill>
+              <a:schemeClr val="tx1"/>
+            </a:solidFill>
+            <a:headEnd w="lg" len="lg"/>
+            <a:tailEnd type="triangle" w="lg" len="lg"/>
+          </a:ln>
+        </p:spPr>
+        <p:style>
+          <a:lnRef idx="1">
+            <a:schemeClr val="accent1"/>
+          </a:lnRef>
+          <a:fillRef idx="0">
+            <a:schemeClr val="accent1"/>
+          </a:fillRef>
+          <a:effectRef idx="0">
+            <a:schemeClr val="accent1"/>
+          </a:effectRef>
+          <a:fontRef idx="minor">
+            <a:schemeClr val="tx1"/>
+          </a:fontRef>
+        </p:style>
+      </p:cxnSp>
+      <p:sp>
+        <p:nvSpPr>
+          <p:cNvPr id="24" name="Textfeld 23">
+            <a:extLst>
+              <a:ext uri="{FF2B5EF4-FFF2-40B4-BE49-F238E27FC236}">
+                <a16:creationId xmlns:a16="http://schemas.microsoft.com/office/drawing/2014/main" id="{85D1710E-186A-4054-A228-537FF060796D}"/>
+              </a:ext>
+            </a:extLst>
+          </p:cNvPr>
+          <p:cNvSpPr txBox="1"/>
+          <p:nvPr/>
+        </p:nvSpPr>
+        <p:spPr>
+          <a:xfrm rot="5400000">
+            <a:off x="300914" y="6059345"/>
+            <a:ext cx="851515" cy="523220"/>
+          </a:xfrm>
+          <a:prstGeom prst="rect">
+            <a:avLst/>
+          </a:prstGeom>
+          <a:noFill/>
+        </p:spPr>
+        <p:txBody>
+          <a:bodyPr wrap="none" rtlCol="0">
+            <a:spAutoFit/>
+          </a:bodyPr>
+          <a:lstStyle/>
+          <a:p>
+            <a:r>
+              <a:rPr lang="de-DE" sz="2800"/>
+              <a:t>time</a:t>
+            </a:r>
+          </a:p>
+        </p:txBody>
+      </p:sp>
+      <p:cxnSp>
+        <p:nvCxnSpPr>
+          <p:cNvPr id="25" name="Gerader Verbinder 24">
+            <a:extLst>
+              <a:ext uri="{FF2B5EF4-FFF2-40B4-BE49-F238E27FC236}">
+                <a16:creationId xmlns:a16="http://schemas.microsoft.com/office/drawing/2014/main" id="{D1D5C7D6-ED5C-4964-99FA-25C3CB90D855}"/>
+              </a:ext>
+            </a:extLst>
+          </p:cNvPr>
+          <p:cNvCxnSpPr/>
+          <p:nvPr/>
+        </p:nvCxnSpPr>
+        <p:spPr>
+          <a:xfrm>
+            <a:off x="292962" y="2927162"/>
+            <a:ext cx="204187" cy="0"/>
+          </a:xfrm>
+          <a:prstGeom prst="line">
+            <a:avLst/>
+          </a:prstGeom>
+          <a:ln w="25400">
+            <a:solidFill>
+              <a:schemeClr val="tx1"/>
+            </a:solidFill>
+            <a:headEnd w="lg" len="lg"/>
+            <a:tailEnd type="none"/>
+          </a:ln>
+        </p:spPr>
+        <p:style>
+          <a:lnRef idx="1">
+            <a:schemeClr val="accent1"/>
+          </a:lnRef>
+          <a:fillRef idx="0">
+            <a:schemeClr val="accent1"/>
+          </a:fillRef>
+          <a:effectRef idx="0">
+            <a:schemeClr val="accent1"/>
+          </a:effectRef>
+          <a:fontRef idx="minor">
+            <a:schemeClr val="tx1"/>
+          </a:fontRef>
+        </p:style>
+      </p:cxnSp>
+      <p:cxnSp>
+        <p:nvCxnSpPr>
+          <p:cNvPr id="27" name="Gerader Verbinder 26">
+            <a:extLst>
+              <a:ext uri="{FF2B5EF4-FFF2-40B4-BE49-F238E27FC236}">
+                <a16:creationId xmlns:a16="http://schemas.microsoft.com/office/drawing/2014/main" id="{29C4BCB1-4154-430E-A923-3DBB1D972BF2}"/>
+              </a:ext>
+            </a:extLst>
+          </p:cNvPr>
+          <p:cNvCxnSpPr/>
+          <p:nvPr/>
+        </p:nvCxnSpPr>
+        <p:spPr>
+          <a:xfrm>
+            <a:off x="292962" y="5898005"/>
+            <a:ext cx="204187" cy="0"/>
+          </a:xfrm>
+          <a:prstGeom prst="line">
+            <a:avLst/>
+          </a:prstGeom>
+          <a:ln w="25400">
+            <a:solidFill>
+              <a:schemeClr val="tx1"/>
+            </a:solidFill>
+            <a:headEnd w="lg" len="lg"/>
+            <a:tailEnd type="none"/>
+          </a:ln>
+        </p:spPr>
+        <p:style>
+          <a:lnRef idx="1">
+            <a:schemeClr val="accent1"/>
+          </a:lnRef>
+          <a:fillRef idx="0">
+            <a:schemeClr val="accent1"/>
+          </a:fillRef>
+          <a:effectRef idx="0">
+            <a:schemeClr val="accent1"/>
+          </a:effectRef>
+          <a:fontRef idx="minor">
+            <a:schemeClr val="tx1"/>
+          </a:fontRef>
+        </p:style>
+      </p:cxnSp>
     </p:spTree>
     <p:extLst>
       <p:ext uri="{BB962C8B-B14F-4D97-AF65-F5344CB8AC3E}">
@@ -12453,8 +13101,8 @@
           </a:p>
         </p:txBody>
       </p:sp>
-      <mc:AlternateContent xmlns:mc="http://schemas.openxmlformats.org/markup-compatibility/2006">
-        <mc:Choice xmlns:a14="http://schemas.microsoft.com/office/drawing/2010/main" Requires="a14">
+      <mc:AlternateContent xmlns:mc="http://schemas.openxmlformats.org/markup-compatibility/2006" xmlns:a14="http://schemas.microsoft.com/office/drawing/2010/main">
+        <mc:Choice Requires="a14">
           <p:sp>
             <p:nvSpPr>
               <p:cNvPr id="3" name="Inhaltsplatzhalter 2">
@@ -12711,7 +13359,7 @@
             </p:txBody>
           </p:sp>
         </mc:Choice>
-        <mc:Fallback>
+        <mc:Fallback xmlns="">
           <p:sp>
             <p:nvSpPr>
               <p:cNvPr id="3" name="Inhaltsplatzhalter 2">
@@ -12820,8 +13468,8 @@
           </a:p>
         </p:txBody>
       </p:sp>
-      <mc:AlternateContent xmlns:mc="http://schemas.openxmlformats.org/markup-compatibility/2006">
-        <mc:Choice xmlns:a14="http://schemas.microsoft.com/office/drawing/2010/main" Requires="a14">
+      <mc:AlternateContent xmlns:mc="http://schemas.openxmlformats.org/markup-compatibility/2006" xmlns:a14="http://schemas.microsoft.com/office/drawing/2010/main">
+        <mc:Choice Requires="a14">
           <p:sp>
             <p:nvSpPr>
               <p:cNvPr id="13" name="Inhaltsplatzhalter 2">
@@ -13282,7 +13930,7 @@
             </p:txBody>
           </p:sp>
         </mc:Choice>
-        <mc:Fallback>
+        <mc:Fallback xmlns="">
           <p:sp>
             <p:nvSpPr>
               <p:cNvPr id="13" name="Inhaltsplatzhalter 2">
@@ -25995,7 +26643,7 @@
                 <a:avLst/>
               </a:prstGeom>
               <a:blipFill>
-                <a:blip r:embed="rId2"/>
+                <a:blip r:embed="rId3"/>
                 <a:stretch>
                   <a:fillRect/>
                 </a:stretch>
@@ -26167,7 +26815,7 @@
                 <a:avLst/>
               </a:prstGeom>
               <a:blipFill>
-                <a:blip r:embed="rId3"/>
+                <a:blip r:embed="rId4"/>
                 <a:stretch>
                   <a:fillRect/>
                 </a:stretch>
@@ -26384,7 +27032,7 @@
                 <a:avLst/>
               </a:prstGeom>
               <a:blipFill>
-                <a:blip r:embed="rId4"/>
+                <a:blip r:embed="rId5"/>
                 <a:stretch>
                   <a:fillRect/>
                 </a:stretch>
@@ -26571,7 +27219,7 @@
                 <a:avLst/>
               </a:prstGeom>
               <a:blipFill>
-                <a:blip r:embed="rId5"/>
+                <a:blip r:embed="rId6"/>
                 <a:stretch>
                   <a:fillRect/>
                 </a:stretch>
@@ -26844,7 +27492,7 @@
                 <a:avLst/>
               </a:prstGeom>
               <a:blipFill>
-                <a:blip r:embed="rId6"/>
+                <a:blip r:embed="rId7"/>
                 <a:stretch>
                   <a:fillRect/>
                 </a:stretch>
@@ -27031,7 +27679,7 @@
                 <a:avLst/>
               </a:prstGeom>
               <a:blipFill>
-                <a:blip r:embed="rId7"/>
+                <a:blip r:embed="rId8"/>
                 <a:stretch>
                   <a:fillRect/>
                 </a:stretch>
@@ -27204,7 +27852,7 @@
                 <a:avLst/>
               </a:prstGeom>
               <a:blipFill>
-                <a:blip r:embed="rId8"/>
+                <a:blip r:embed="rId9"/>
                 <a:stretch>
                   <a:fillRect/>
                 </a:stretch>
@@ -27332,7 +27980,7 @@
                 <a:avLst/>
               </a:prstGeom>
               <a:blipFill>
-                <a:blip r:embed="rId9"/>
+                <a:blip r:embed="rId10"/>
                 <a:stretch>
                   <a:fillRect/>
                 </a:stretch>
@@ -27460,7 +28108,7 @@
                 <a:avLst/>
               </a:prstGeom>
               <a:blipFill>
-                <a:blip r:embed="rId10"/>
+                <a:blip r:embed="rId11"/>
                 <a:stretch>
                   <a:fillRect/>
                 </a:stretch>
@@ -27581,7 +28229,7 @@
                 <a:avLst/>
               </a:prstGeom>
               <a:blipFill>
-                <a:blip r:embed="rId11"/>
+                <a:blip r:embed="rId12"/>
                 <a:stretch>
                   <a:fillRect l="-3782" r="-2941" b="-13084"/>
                 </a:stretch>
@@ -27692,6 +28340,171 @@
     <p:extLst>
       <p:ext uri="{BB962C8B-B14F-4D97-AF65-F5344CB8AC3E}">
         <p14:creationId xmlns:p14="http://schemas.microsoft.com/office/powerpoint/2010/main" val="3744564629"/>
+      </p:ext>
+    </p:extLst>
+  </p:cSld>
+  <p:clrMapOvr>
+    <a:masterClrMapping/>
+  </p:clrMapOvr>
+</p:sld>
+</file>
+
+<file path=ppt/slides/slide24.xml><?xml version="1.0" encoding="utf-8"?>
+<p:sld xmlns:a="http://schemas.openxmlformats.org/drawingml/2006/main" xmlns:r="http://schemas.openxmlformats.org/officeDocument/2006/relationships" xmlns:p="http://schemas.openxmlformats.org/presentationml/2006/main">
+  <p:cSld>
+    <p:spTree>
+      <p:nvGrpSpPr>
+        <p:cNvPr id="1" name=""/>
+        <p:cNvGrpSpPr/>
+        <p:nvPr/>
+      </p:nvGrpSpPr>
+      <p:grpSpPr>
+        <a:xfrm>
+          <a:off x="0" y="0"/>
+          <a:ext cx="0" cy="0"/>
+          <a:chOff x="0" y="0"/>
+          <a:chExt cx="0" cy="0"/>
+        </a:xfrm>
+      </p:grpSpPr>
+      <p:pic>
+        <p:nvPicPr>
+          <p:cNvPr id="6" name="Grafik 5">
+            <a:extLst>
+              <a:ext uri="{FF2B5EF4-FFF2-40B4-BE49-F238E27FC236}">
+                <a16:creationId xmlns:a16="http://schemas.microsoft.com/office/drawing/2014/main" id="{DDE577E6-2843-4349-BB6D-0D30EA2FC8FE}"/>
+              </a:ext>
+            </a:extLst>
+          </p:cNvPr>
+          <p:cNvPicPr>
+            <a:picLocks noChangeAspect="1"/>
+          </p:cNvPicPr>
+          <p:nvPr/>
+        </p:nvPicPr>
+        <p:blipFill>
+          <a:blip r:embed="rId2">
+            <a:extLst>
+              <a:ext uri="{28A0092B-C50C-407E-A947-70E740481C1C}">
+                <a14:useLocalDpi xmlns:a14="http://schemas.microsoft.com/office/drawing/2010/main" val="0"/>
+              </a:ext>
+            </a:extLst>
+          </a:blip>
+          <a:stretch>
+            <a:fillRect/>
+          </a:stretch>
+        </p:blipFill>
+        <p:spPr>
+          <a:xfrm>
+            <a:off x="0" y="0"/>
+            <a:ext cx="9144000" cy="6858000"/>
+          </a:xfrm>
+          <a:prstGeom prst="rect">
+            <a:avLst/>
+          </a:prstGeom>
+        </p:spPr>
+      </p:pic>
+      <p:sp>
+        <p:nvSpPr>
+          <p:cNvPr id="2" name="Titel 1">
+            <a:extLst>
+              <a:ext uri="{FF2B5EF4-FFF2-40B4-BE49-F238E27FC236}">
+                <a16:creationId xmlns:a16="http://schemas.microsoft.com/office/drawing/2014/main" id="{543F89E8-EB1E-4141-B248-1ED47F116E7F}"/>
+              </a:ext>
+            </a:extLst>
+          </p:cNvPr>
+          <p:cNvSpPr>
+            <a:spLocks noGrp="1"/>
+          </p:cNvSpPr>
+          <p:nvPr>
+            <p:ph type="ctrTitle"/>
+          </p:nvPr>
+        </p:nvSpPr>
+        <p:spPr>
+          <a:xfrm>
+            <a:off x="1143000" y="142121"/>
+            <a:ext cx="6858000" cy="1105932"/>
+          </a:xfrm>
+        </p:spPr>
+        <p:txBody>
+          <a:bodyPr>
+            <a:normAutofit/>
+          </a:bodyPr>
+          <a:lstStyle/>
+          <a:p>
+            <a:r>
+              <a:rPr lang="de-DE" sz="6600" b="1"/>
+              <a:t>Thank you!</a:t>
+            </a:r>
+          </a:p>
+        </p:txBody>
+      </p:sp>
+      <p:sp>
+        <p:nvSpPr>
+          <p:cNvPr id="3" name="Untertitel 2">
+            <a:extLst>
+              <a:ext uri="{FF2B5EF4-FFF2-40B4-BE49-F238E27FC236}">
+                <a16:creationId xmlns:a16="http://schemas.microsoft.com/office/drawing/2014/main" id="{47AC8E05-8730-485A-BFE2-B80BD6066C4F}"/>
+              </a:ext>
+            </a:extLst>
+          </p:cNvPr>
+          <p:cNvSpPr>
+            <a:spLocks noGrp="1"/>
+          </p:cNvSpPr>
+          <p:nvPr>
+            <p:ph type="subTitle" idx="1"/>
+          </p:nvPr>
+        </p:nvSpPr>
+        <p:spPr>
+          <a:xfrm>
+            <a:off x="1143000" y="1248053"/>
+            <a:ext cx="6858000" cy="1655762"/>
+          </a:xfrm>
+        </p:spPr>
+        <p:txBody>
+          <a:bodyPr>
+            <a:normAutofit/>
+          </a:bodyPr>
+          <a:lstStyle/>
+          <a:p>
+            <a:r>
+              <a:rPr lang="de-DE" sz="2000"/>
+              <a:t>Any Questions?</a:t>
+            </a:r>
+          </a:p>
+        </p:txBody>
+      </p:sp>
+      <p:sp>
+        <p:nvSpPr>
+          <p:cNvPr id="4" name="Foliennummernplatzhalter 3">
+            <a:extLst>
+              <a:ext uri="{FF2B5EF4-FFF2-40B4-BE49-F238E27FC236}">
+                <a16:creationId xmlns:a16="http://schemas.microsoft.com/office/drawing/2014/main" id="{22DAB2F7-AC9D-44AE-9A6F-36A71347227A}"/>
+              </a:ext>
+            </a:extLst>
+          </p:cNvPr>
+          <p:cNvSpPr>
+            <a:spLocks noGrp="1"/>
+          </p:cNvSpPr>
+          <p:nvPr>
+            <p:ph type="sldNum" sz="quarter" idx="12"/>
+          </p:nvPr>
+        </p:nvSpPr>
+        <p:spPr/>
+        <p:txBody>
+          <a:bodyPr/>
+          <a:lstStyle/>
+          <a:p>
+            <a:fld id="{0696A970-E1A0-4FA3-8434-947DF6AD858B}" type="slidenum">
+              <a:rPr lang="de-DE" smtClean="0"/>
+              <a:t>24</a:t>
+            </a:fld>
+            <a:endParaRPr lang="de-DE"/>
+          </a:p>
+        </p:txBody>
+      </p:sp>
+    </p:spTree>
+    <p:extLst>
+      <p:ext uri="{BB962C8B-B14F-4D97-AF65-F5344CB8AC3E}">
+        <p14:creationId xmlns:p14="http://schemas.microsoft.com/office/powerpoint/2010/main" val="2056526210"/>
       </p:ext>
     </p:extLst>
   </p:cSld>
@@ -34333,7 +35146,7 @@
                 <a:avLst/>
               </a:prstGeom>
               <a:blipFill>
-                <a:blip r:embed="rId2"/>
+                <a:blip r:embed="rId3"/>
                 <a:stretch>
                   <a:fillRect/>
                 </a:stretch>
@@ -34477,7 +35290,7 @@
                 <a:avLst/>
               </a:prstGeom>
               <a:blipFill>
-                <a:blip r:embed="rId3"/>
+                <a:blip r:embed="rId4"/>
                 <a:stretch>
                   <a:fillRect/>
                 </a:stretch>
@@ -34682,7 +35495,7 @@
                 <a:avLst/>
               </a:prstGeom>
               <a:blipFill>
-                <a:blip r:embed="rId4"/>
+                <a:blip r:embed="rId5"/>
                 <a:stretch>
                   <a:fillRect/>
                 </a:stretch>
@@ -34859,7 +35672,7 @@
                 <a:avLst/>
               </a:prstGeom>
               <a:blipFill>
-                <a:blip r:embed="rId5"/>
+                <a:blip r:embed="rId6"/>
                 <a:stretch>
                   <a:fillRect/>
                 </a:stretch>
@@ -35120,7 +35933,7 @@
                 <a:avLst/>
               </a:prstGeom>
               <a:blipFill>
-                <a:blip r:embed="rId6"/>
+                <a:blip r:embed="rId7"/>
                 <a:stretch>
                   <a:fillRect/>
                 </a:stretch>
@@ -35187,8 +36000,8 @@
           </a:fontRef>
         </p:style>
       </p:cxnSp>
-      <mc:AlternateContent xmlns:mc="http://schemas.openxmlformats.org/markup-compatibility/2006">
-        <mc:Choice xmlns:a14="http://schemas.microsoft.com/office/drawing/2010/main" Requires="a14">
+      <mc:AlternateContent xmlns:mc="http://schemas.openxmlformats.org/markup-compatibility/2006" xmlns:a14="http://schemas.microsoft.com/office/drawing/2010/main">
+        <mc:Choice Requires="a14">
           <p:sp>
             <p:nvSpPr>
               <p:cNvPr id="10" name="Rechteck 9">
@@ -35471,7 +36284,7 @@
             </p:txBody>
           </p:sp>
         </mc:Choice>
-        <mc:Fallback>
+        <mc:Fallback xmlns="">
           <p:sp>
             <p:nvSpPr>
               <p:cNvPr id="10" name="Rechteck 9">
@@ -35495,7 +36308,7 @@
                 <a:avLst/>
               </a:prstGeom>
               <a:blipFill>
-                <a:blip r:embed="rId7"/>
+                <a:blip r:embed="rId8"/>
                 <a:stretch>
                   <a:fillRect l="-1483" t="-10000" b="-17333"/>
                 </a:stretch>
@@ -35582,8 +36395,8 @@
           </a:p>
         </p:txBody>
       </p:sp>
-      <mc:AlternateContent xmlns:mc="http://schemas.openxmlformats.org/markup-compatibility/2006">
-        <mc:Choice xmlns:a14="http://schemas.microsoft.com/office/drawing/2010/main" Requires="a14">
+      <mc:AlternateContent xmlns:mc="http://schemas.openxmlformats.org/markup-compatibility/2006" xmlns:a14="http://schemas.microsoft.com/office/drawing/2010/main">
+        <mc:Choice Requires="a14">
           <p:sp>
             <p:nvSpPr>
               <p:cNvPr id="3" name="Inhaltsplatzhalter 2">
@@ -36705,7 +37518,7 @@
             </p:txBody>
           </p:sp>
         </mc:Choice>
-        <mc:Fallback>
+        <mc:Fallback xmlns="">
           <p:sp>
             <p:nvSpPr>
               <p:cNvPr id="3" name="Inhaltsplatzhalter 2">
@@ -36728,7 +37541,7 @@
                 <a:ext cx="7886700" cy="5024154"/>
               </a:xfrm>
               <a:blipFill>
-                <a:blip r:embed="rId2"/>
+                <a:blip r:embed="rId3"/>
                 <a:stretch>
                   <a:fillRect l="-1391" t="-2427"/>
                 </a:stretch>

</xml_diff>

<commit_message>
Cleaned the source Code, Changed to commons-math-Vector2D from my own class.
</commit_message>
<xml_diff>
--- a/vortrag/ba_seminar_presentation_reduce.pptx
+++ b/vortrag/ba_seminar_presentation_reduce.pptx
@@ -5,7 +5,7 @@
     <p:sldMasterId id="2147483648" r:id="rId1"/>
   </p:sldMasterIdLst>
   <p:notesMasterIdLst>
-    <p:notesMasterId r:id="rId26"/>
+    <p:notesMasterId r:id="rId28"/>
   </p:notesMasterIdLst>
   <p:sldIdLst>
     <p:sldId id="256" r:id="rId2"/>
@@ -31,7 +31,9 @@
     <p:sldId id="272" r:id="rId22"/>
     <p:sldId id="270" r:id="rId23"/>
     <p:sldId id="273" r:id="rId24"/>
-    <p:sldId id="289" r:id="rId25"/>
+    <p:sldId id="290" r:id="rId25"/>
+    <p:sldId id="291" r:id="rId26"/>
+    <p:sldId id="289" r:id="rId27"/>
   </p:sldIdLst>
   <p:sldSz cx="9144000" cy="6858000" type="screen4x3"/>
   <p:notesSz cx="6858000" cy="9144000"/>
@@ -28366,6 +28368,450 @@
           <a:chExt cx="0" cy="0"/>
         </a:xfrm>
       </p:grpSpPr>
+      <p:sp>
+        <p:nvSpPr>
+          <p:cNvPr id="2" name="Titel 1">
+            <a:extLst>
+              <a:ext uri="{FF2B5EF4-FFF2-40B4-BE49-F238E27FC236}">
+                <a16:creationId xmlns:a16="http://schemas.microsoft.com/office/drawing/2014/main" id="{05F9BAA4-7E2C-49B0-A8A8-D436EB0C28B8}"/>
+              </a:ext>
+            </a:extLst>
+          </p:cNvPr>
+          <p:cNvSpPr>
+            <a:spLocks noGrp="1"/>
+          </p:cNvSpPr>
+          <p:nvPr>
+            <p:ph type="title"/>
+          </p:nvPr>
+        </p:nvSpPr>
+        <p:spPr>
+          <a:xfrm>
+            <a:off x="0" y="18255"/>
+            <a:ext cx="9144000" cy="1056401"/>
+          </a:xfrm>
+        </p:spPr>
+        <p:txBody>
+          <a:bodyPr>
+            <a:normAutofit/>
+          </a:bodyPr>
+          <a:lstStyle/>
+          <a:p>
+            <a:pPr algn="ctr"/>
+            <a:r>
+              <a:rPr lang="de-DE" sz="5400"/>
+              <a:t>Sources (online)</a:t>
+            </a:r>
+          </a:p>
+        </p:txBody>
+      </p:sp>
+      <p:sp>
+        <p:nvSpPr>
+          <p:cNvPr id="3" name="Inhaltsplatzhalter 2">
+            <a:extLst>
+              <a:ext uri="{FF2B5EF4-FFF2-40B4-BE49-F238E27FC236}">
+                <a16:creationId xmlns:a16="http://schemas.microsoft.com/office/drawing/2014/main" id="{9962D4C6-1989-457F-A5DB-9CC2C96CDAE3}"/>
+              </a:ext>
+            </a:extLst>
+          </p:cNvPr>
+          <p:cNvSpPr>
+            <a:spLocks noGrp="1"/>
+          </p:cNvSpPr>
+          <p:nvPr>
+            <p:ph idx="1"/>
+          </p:nvPr>
+        </p:nvSpPr>
+        <p:spPr/>
+        <p:txBody>
+          <a:bodyPr>
+            <a:normAutofit fontScale="92500" lnSpcReduction="20000"/>
+          </a:bodyPr>
+          <a:lstStyle/>
+          <a:p>
+            <a:r>
+              <a:rPr lang="de-DE" sz="2800">
+                <a:latin typeface="Corbel" panose="020B0503020204020204" pitchFamily="34" charset="0"/>
+                <a:hlinkClick r:id="rId2"/>
+              </a:rPr>
+              <a:t>https://en.wikipedia.org/wiki/Kalman_filter</a:t>
+            </a:r>
+            <a:endParaRPr lang="de-DE" sz="2800">
+              <a:latin typeface="Corbel" panose="020B0503020204020204" pitchFamily="34" charset="0"/>
+            </a:endParaRPr>
+          </a:p>
+          <a:p>
+            <a:r>
+              <a:rPr lang="de-DE" sz="2800">
+                <a:latin typeface="Corbel" panose="020B0503020204020204" pitchFamily="34" charset="0"/>
+                <a:hlinkClick r:id="rId3"/>
+              </a:rPr>
+              <a:t>https://en.wikipedia.org/wiki/Hidden_Markov_model</a:t>
+            </a:r>
+            <a:endParaRPr lang="de-DE" sz="2800">
+              <a:latin typeface="Corbel" panose="020B0503020204020204" pitchFamily="34" charset="0"/>
+            </a:endParaRPr>
+          </a:p>
+          <a:p>
+            <a:r>
+              <a:rPr lang="de-DE" sz="2800">
+                <a:latin typeface="Corbel" panose="020B0503020204020204" pitchFamily="34" charset="0"/>
+                <a:hlinkClick r:id="rId4"/>
+              </a:rPr>
+              <a:t>https://en.wikipedia.org/wiki/Alpha_beta_filter</a:t>
+            </a:r>
+            <a:endParaRPr lang="de-DE" sz="2800">
+              <a:latin typeface="Corbel" panose="020B0503020204020204" pitchFamily="34" charset="0"/>
+            </a:endParaRPr>
+          </a:p>
+          <a:p>
+            <a:r>
+              <a:rPr lang="de-DE" sz="2800">
+                <a:latin typeface="Corbel" panose="020B0503020204020204" pitchFamily="34" charset="0"/>
+              </a:rPr>
+              <a:t>Tim Babb – How a Kalman-Filter works, in pictures (</a:t>
+            </a:r>
+            <a:r>
+              <a:rPr lang="de-DE" sz="2800">
+                <a:latin typeface="Corbel" panose="020B0503020204020204" pitchFamily="34" charset="0"/>
+                <a:hlinkClick r:id="rId5"/>
+              </a:rPr>
+              <a:t>http://www.bzarg.com/p/how-a-kalman-filter-works-in-pictures/</a:t>
+            </a:r>
+            <a:r>
+              <a:rPr lang="de-DE" sz="2800">
+                <a:latin typeface="Corbel" panose="020B0503020204020204" pitchFamily="34" charset="0"/>
+              </a:rPr>
+              <a:t>) </a:t>
+            </a:r>
+          </a:p>
+          <a:p>
+            <a:r>
+              <a:rPr lang="de-DE" sz="2800">
+                <a:latin typeface="Corbel" panose="020B0503020204020204" pitchFamily="34" charset="0"/>
+              </a:rPr>
+              <a:t>Roger R. Labbe – Kalman and Bayesian Filters in Python (</a:t>
+            </a:r>
+            <a:r>
+              <a:rPr lang="de-DE" sz="2800">
+                <a:latin typeface="Corbel" panose="020B0503020204020204" pitchFamily="34" charset="0"/>
+                <a:hlinkClick r:id="rId6"/>
+              </a:rPr>
+              <a:t>https://github.com/rlabbe/Kalman-and-Bayesian-Filters-in-Python</a:t>
+            </a:r>
+            <a:r>
+              <a:rPr lang="de-DE" sz="2800">
+                <a:latin typeface="Corbel" panose="020B0503020204020204" pitchFamily="34" charset="0"/>
+              </a:rPr>
+              <a:t>) </a:t>
+            </a:r>
+          </a:p>
+          <a:p>
+            <a:endParaRPr lang="de-DE" sz="2800">
+              <a:latin typeface="Corbel" panose="020B0503020204020204" pitchFamily="34" charset="0"/>
+            </a:endParaRPr>
+          </a:p>
+          <a:p>
+            <a:endParaRPr lang="de-DE" sz="2800">
+              <a:latin typeface="Corbel" panose="020B0503020204020204" pitchFamily="34" charset="0"/>
+            </a:endParaRPr>
+          </a:p>
+          <a:p>
+            <a:pPr marL="0" indent="0">
+              <a:buNone/>
+            </a:pPr>
+            <a:r>
+              <a:rPr lang="de-DE" sz="2800">
+                <a:latin typeface="Corbel" panose="020B0503020204020204" pitchFamily="34" charset="0"/>
+              </a:rPr>
+              <a:t>All Links last visited on September 24th, 2018</a:t>
+            </a:r>
+          </a:p>
+        </p:txBody>
+      </p:sp>
+      <p:cxnSp>
+        <p:nvCxnSpPr>
+          <p:cNvPr id="5" name="Gerader Verbinder 4">
+            <a:extLst>
+              <a:ext uri="{FF2B5EF4-FFF2-40B4-BE49-F238E27FC236}">
+                <a16:creationId xmlns:a16="http://schemas.microsoft.com/office/drawing/2014/main" id="{1892A047-1063-4568-A9A5-DA40684BA449}"/>
+              </a:ext>
+            </a:extLst>
+          </p:cNvPr>
+          <p:cNvCxnSpPr/>
+          <p:nvPr/>
+        </p:nvCxnSpPr>
+        <p:spPr>
+          <a:xfrm>
+            <a:off x="0" y="1065231"/>
+            <a:ext cx="9144000" cy="0"/>
+          </a:xfrm>
+          <a:prstGeom prst="line">
+            <a:avLst/>
+          </a:prstGeom>
+        </p:spPr>
+        <p:style>
+          <a:lnRef idx="1">
+            <a:schemeClr val="accent1"/>
+          </a:lnRef>
+          <a:fillRef idx="0">
+            <a:schemeClr val="accent1"/>
+          </a:fillRef>
+          <a:effectRef idx="0">
+            <a:schemeClr val="accent1"/>
+          </a:effectRef>
+          <a:fontRef idx="minor">
+            <a:schemeClr val="tx1"/>
+          </a:fontRef>
+        </p:style>
+      </p:cxnSp>
+      <p:sp>
+        <p:nvSpPr>
+          <p:cNvPr id="6" name="Foliennummernplatzhalter 5">
+            <a:extLst>
+              <a:ext uri="{FF2B5EF4-FFF2-40B4-BE49-F238E27FC236}">
+                <a16:creationId xmlns:a16="http://schemas.microsoft.com/office/drawing/2014/main" id="{5140CF2F-6F7F-44F0-8F3E-6C2234A57167}"/>
+              </a:ext>
+            </a:extLst>
+          </p:cNvPr>
+          <p:cNvSpPr>
+            <a:spLocks noGrp="1"/>
+          </p:cNvSpPr>
+          <p:nvPr>
+            <p:ph type="sldNum" sz="quarter" idx="12"/>
+          </p:nvPr>
+        </p:nvSpPr>
+        <p:spPr/>
+        <p:txBody>
+          <a:bodyPr/>
+          <a:lstStyle/>
+          <a:p>
+            <a:fld id="{0696A970-E1A0-4FA3-8434-947DF6AD858B}" type="slidenum">
+              <a:rPr lang="de-DE" smtClean="0"/>
+              <a:t>24</a:t>
+            </a:fld>
+            <a:endParaRPr lang="de-DE"/>
+          </a:p>
+        </p:txBody>
+      </p:sp>
+    </p:spTree>
+    <p:extLst>
+      <p:ext uri="{BB962C8B-B14F-4D97-AF65-F5344CB8AC3E}">
+        <p14:creationId xmlns:p14="http://schemas.microsoft.com/office/powerpoint/2010/main" val="3923882804"/>
+      </p:ext>
+    </p:extLst>
+  </p:cSld>
+  <p:clrMapOvr>
+    <a:masterClrMapping/>
+  </p:clrMapOvr>
+</p:sld>
+</file>
+
+<file path=ppt/slides/slide25.xml><?xml version="1.0" encoding="utf-8"?>
+<p:sld xmlns:a="http://schemas.openxmlformats.org/drawingml/2006/main" xmlns:r="http://schemas.openxmlformats.org/officeDocument/2006/relationships" xmlns:p="http://schemas.openxmlformats.org/presentationml/2006/main">
+  <p:cSld>
+    <p:spTree>
+      <p:nvGrpSpPr>
+        <p:cNvPr id="1" name=""/>
+        <p:cNvGrpSpPr/>
+        <p:nvPr/>
+      </p:nvGrpSpPr>
+      <p:grpSpPr>
+        <a:xfrm>
+          <a:off x="0" y="0"/>
+          <a:ext cx="0" cy="0"/>
+          <a:chOff x="0" y="0"/>
+          <a:chExt cx="0" cy="0"/>
+        </a:xfrm>
+      </p:grpSpPr>
+      <p:sp>
+        <p:nvSpPr>
+          <p:cNvPr id="2" name="Titel 1">
+            <a:extLst>
+              <a:ext uri="{FF2B5EF4-FFF2-40B4-BE49-F238E27FC236}">
+                <a16:creationId xmlns:a16="http://schemas.microsoft.com/office/drawing/2014/main" id="{05F9BAA4-7E2C-49B0-A8A8-D436EB0C28B8}"/>
+              </a:ext>
+            </a:extLst>
+          </p:cNvPr>
+          <p:cNvSpPr>
+            <a:spLocks noGrp="1"/>
+          </p:cNvSpPr>
+          <p:nvPr>
+            <p:ph type="title"/>
+          </p:nvPr>
+        </p:nvSpPr>
+        <p:spPr>
+          <a:xfrm>
+            <a:off x="0" y="18255"/>
+            <a:ext cx="9144000" cy="1056401"/>
+          </a:xfrm>
+        </p:spPr>
+        <p:txBody>
+          <a:bodyPr>
+            <a:normAutofit/>
+          </a:bodyPr>
+          <a:lstStyle/>
+          <a:p>
+            <a:pPr algn="ctr"/>
+            <a:r>
+              <a:rPr lang="de-DE" sz="5400"/>
+              <a:t>Sources (books)</a:t>
+            </a:r>
+          </a:p>
+        </p:txBody>
+      </p:sp>
+      <p:sp>
+        <p:nvSpPr>
+          <p:cNvPr id="3" name="Inhaltsplatzhalter 2">
+            <a:extLst>
+              <a:ext uri="{FF2B5EF4-FFF2-40B4-BE49-F238E27FC236}">
+                <a16:creationId xmlns:a16="http://schemas.microsoft.com/office/drawing/2014/main" id="{9962D4C6-1989-457F-A5DB-9CC2C96CDAE3}"/>
+              </a:ext>
+            </a:extLst>
+          </p:cNvPr>
+          <p:cNvSpPr>
+            <a:spLocks noGrp="1"/>
+          </p:cNvSpPr>
+          <p:nvPr>
+            <p:ph idx="1"/>
+          </p:nvPr>
+        </p:nvSpPr>
+        <p:spPr/>
+        <p:txBody>
+          <a:bodyPr>
+            <a:normAutofit/>
+          </a:bodyPr>
+          <a:lstStyle/>
+          <a:p>
+            <a:r>
+              <a:rPr lang="de-DE" sz="2800">
+                <a:latin typeface="Corbel" panose="020B0503020204020204" pitchFamily="34" charset="0"/>
+              </a:rPr>
+              <a:t>Eli Brookner - </a:t>
+            </a:r>
+            <a:r>
+              <a:rPr lang="en-US" sz="2800">
+                <a:latin typeface="Corbel" panose="020B0503020204020204" pitchFamily="34" charset="0"/>
+              </a:rPr>
+              <a:t>Tracking and Kalman Filtering Made Easy (Wiley Interscience 2002)</a:t>
+            </a:r>
+            <a:endParaRPr lang="de-DE" sz="2800">
+              <a:latin typeface="Corbel" panose="020B0503020204020204" pitchFamily="34" charset="0"/>
+            </a:endParaRPr>
+          </a:p>
+          <a:p>
+            <a:endParaRPr lang="de-DE" sz="2800">
+              <a:latin typeface="Corbel" panose="020B0503020204020204" pitchFamily="34" charset="0"/>
+            </a:endParaRPr>
+          </a:p>
+          <a:p>
+            <a:endParaRPr lang="de-DE" sz="2800">
+              <a:latin typeface="Corbel" panose="020B0503020204020204" pitchFamily="34" charset="0"/>
+            </a:endParaRPr>
+          </a:p>
+          <a:p>
+            <a:pPr marL="0" indent="0">
+              <a:buNone/>
+            </a:pPr>
+            <a:endParaRPr lang="de-DE" sz="2800">
+              <a:latin typeface="Corbel" panose="020B0503020204020204" pitchFamily="34" charset="0"/>
+            </a:endParaRPr>
+          </a:p>
+        </p:txBody>
+      </p:sp>
+      <p:cxnSp>
+        <p:nvCxnSpPr>
+          <p:cNvPr id="5" name="Gerader Verbinder 4">
+            <a:extLst>
+              <a:ext uri="{FF2B5EF4-FFF2-40B4-BE49-F238E27FC236}">
+                <a16:creationId xmlns:a16="http://schemas.microsoft.com/office/drawing/2014/main" id="{1892A047-1063-4568-A9A5-DA40684BA449}"/>
+              </a:ext>
+            </a:extLst>
+          </p:cNvPr>
+          <p:cNvCxnSpPr/>
+          <p:nvPr/>
+        </p:nvCxnSpPr>
+        <p:spPr>
+          <a:xfrm>
+            <a:off x="0" y="1065231"/>
+            <a:ext cx="9144000" cy="0"/>
+          </a:xfrm>
+          <a:prstGeom prst="line">
+            <a:avLst/>
+          </a:prstGeom>
+        </p:spPr>
+        <p:style>
+          <a:lnRef idx="1">
+            <a:schemeClr val="accent1"/>
+          </a:lnRef>
+          <a:fillRef idx="0">
+            <a:schemeClr val="accent1"/>
+          </a:fillRef>
+          <a:effectRef idx="0">
+            <a:schemeClr val="accent1"/>
+          </a:effectRef>
+          <a:fontRef idx="minor">
+            <a:schemeClr val="tx1"/>
+          </a:fontRef>
+        </p:style>
+      </p:cxnSp>
+      <p:sp>
+        <p:nvSpPr>
+          <p:cNvPr id="6" name="Foliennummernplatzhalter 5">
+            <a:extLst>
+              <a:ext uri="{FF2B5EF4-FFF2-40B4-BE49-F238E27FC236}">
+                <a16:creationId xmlns:a16="http://schemas.microsoft.com/office/drawing/2014/main" id="{5140CF2F-6F7F-44F0-8F3E-6C2234A57167}"/>
+              </a:ext>
+            </a:extLst>
+          </p:cNvPr>
+          <p:cNvSpPr>
+            <a:spLocks noGrp="1"/>
+          </p:cNvSpPr>
+          <p:nvPr>
+            <p:ph type="sldNum" sz="quarter" idx="12"/>
+          </p:nvPr>
+        </p:nvSpPr>
+        <p:spPr/>
+        <p:txBody>
+          <a:bodyPr/>
+          <a:lstStyle/>
+          <a:p>
+            <a:fld id="{0696A970-E1A0-4FA3-8434-947DF6AD858B}" type="slidenum">
+              <a:rPr lang="de-DE" smtClean="0"/>
+              <a:t>25</a:t>
+            </a:fld>
+            <a:endParaRPr lang="de-DE"/>
+          </a:p>
+        </p:txBody>
+      </p:sp>
+    </p:spTree>
+    <p:extLst>
+      <p:ext uri="{BB962C8B-B14F-4D97-AF65-F5344CB8AC3E}">
+        <p14:creationId xmlns:p14="http://schemas.microsoft.com/office/powerpoint/2010/main" val="4155031067"/>
+      </p:ext>
+    </p:extLst>
+  </p:cSld>
+  <p:clrMapOvr>
+    <a:masterClrMapping/>
+  </p:clrMapOvr>
+</p:sld>
+</file>
+
+<file path=ppt/slides/slide26.xml><?xml version="1.0" encoding="utf-8"?>
+<p:sld xmlns:a="http://schemas.openxmlformats.org/drawingml/2006/main" xmlns:r="http://schemas.openxmlformats.org/officeDocument/2006/relationships" xmlns:p="http://schemas.openxmlformats.org/presentationml/2006/main">
+  <p:cSld>
+    <p:spTree>
+      <p:nvGrpSpPr>
+        <p:cNvPr id="1" name=""/>
+        <p:cNvGrpSpPr/>
+        <p:nvPr/>
+      </p:nvGrpSpPr>
+      <p:grpSpPr>
+        <a:xfrm>
+          <a:off x="0" y="0"/>
+          <a:ext cx="0" cy="0"/>
+          <a:chOff x="0" y="0"/>
+          <a:chExt cx="0" cy="0"/>
+        </a:xfrm>
+      </p:grpSpPr>
       <p:pic>
         <p:nvPicPr>
           <p:cNvPr id="6" name="Grafik 5">
@@ -28495,7 +28941,7 @@
           <a:p>
             <a:fld id="{0696A970-E1A0-4FA3-8434-947DF6AD858B}" type="slidenum">
               <a:rPr lang="de-DE" smtClean="0"/>
-              <a:t>24</a:t>
+              <a:t>26</a:t>
             </a:fld>
             <a:endParaRPr lang="de-DE"/>
           </a:p>

</xml_diff>